<commit_message>
translation を v4 に
校正を ChatGPT を使った方法に変更
</commit_message>
<xml_diff>
--- a/translation.pptx
+++ b/translation.pptx
@@ -5,7 +5,7 @@
     <p:sldMasterId id="2147483669" r:id="rId1"/>
   </p:sldMasterIdLst>
   <p:notesMasterIdLst>
-    <p:notesMasterId r:id="rId44"/>
+    <p:notesMasterId r:id="rId49"/>
   </p:notesMasterIdLst>
   <p:sldIdLst>
     <p:sldId id="440" r:id="rId2"/>
@@ -36,20 +36,25 @@
     <p:sldId id="462" r:id="rId27"/>
     <p:sldId id="460" r:id="rId28"/>
     <p:sldId id="463" r:id="rId29"/>
-    <p:sldId id="464" r:id="rId30"/>
-    <p:sldId id="465" r:id="rId31"/>
-    <p:sldId id="475" r:id="rId32"/>
-    <p:sldId id="466" r:id="rId33"/>
-    <p:sldId id="467" r:id="rId34"/>
-    <p:sldId id="468" r:id="rId35"/>
-    <p:sldId id="476" r:id="rId36"/>
-    <p:sldId id="470" r:id="rId37"/>
-    <p:sldId id="471" r:id="rId38"/>
-    <p:sldId id="473" r:id="rId39"/>
-    <p:sldId id="478" r:id="rId40"/>
-    <p:sldId id="479" r:id="rId41"/>
-    <p:sldId id="477" r:id="rId42"/>
-    <p:sldId id="480" r:id="rId43"/>
+    <p:sldId id="465" r:id="rId30"/>
+    <p:sldId id="475" r:id="rId31"/>
+    <p:sldId id="466" r:id="rId32"/>
+    <p:sldId id="467" r:id="rId33"/>
+    <p:sldId id="468" r:id="rId34"/>
+    <p:sldId id="476" r:id="rId35"/>
+    <p:sldId id="478" r:id="rId36"/>
+    <p:sldId id="484" r:id="rId37"/>
+    <p:sldId id="486" r:id="rId38"/>
+    <p:sldId id="487" r:id="rId39"/>
+    <p:sldId id="485" r:id="rId40"/>
+    <p:sldId id="488" r:id="rId41"/>
+    <p:sldId id="490" r:id="rId42"/>
+    <p:sldId id="489" r:id="rId43"/>
+    <p:sldId id="491" r:id="rId44"/>
+    <p:sldId id="492" r:id="rId45"/>
+    <p:sldId id="470" r:id="rId46"/>
+    <p:sldId id="471" r:id="rId47"/>
+    <p:sldId id="473" r:id="rId48"/>
   </p:sldIdLst>
   <p:sldSz cx="9144000" cy="6858000" type="screen4x3"/>
   <p:notesSz cx="6858000" cy="9144000"/>
@@ -252,7 +257,7 @@
           <a:p>
             <a:fld id="{2ABE53D4-1A7B-4FFE-8A95-4265B045F058}" type="datetimeFigureOut">
               <a:rPr kumimoji="1" lang="ja-JP" altLang="en-US" smtClean="0"/>
-              <a:t>2023/2/1</a:t>
+              <a:t>2023/12/5</a:t>
             </a:fld>
             <a:endParaRPr kumimoji="1" lang="ja-JP" altLang="en-US"/>
           </a:p>
@@ -3047,8 +3052,12 @@
               <a:t>自動翻訳を使った英語論文の書き方 </a:t>
             </a:r>
             <a:r>
-              <a:rPr kumimoji="1" lang="en-US" altLang="ja-JP" sz="2800"/>
-              <a:t>v3</a:t>
+              <a:rPr kumimoji="1" lang="en-US" altLang="ja-JP" sz="2800" dirty="0"/>
+              <a:t>v</a:t>
+            </a:r>
+            <a:r>
+              <a:rPr lang="en-US" altLang="ja-JP" sz="2800" dirty="0"/>
+              <a:t>4</a:t>
             </a:r>
             <a:endParaRPr kumimoji="1" lang="ja-JP" altLang="en-US" sz="2800" dirty="0"/>
           </a:p>
@@ -3552,6 +3561,30 @@
               <a:rPr lang="ja-JP" altLang="en-US" dirty="0"/>
               <a:t>以降では，上記の構造を実現する方法を順に説明</a:t>
             </a:r>
+            <a:endParaRPr lang="en-US" altLang="ja-JP" dirty="0"/>
+          </a:p>
+          <a:p>
+            <a:pPr lvl="1"/>
+            <a:r>
+              <a:rPr lang="ja-JP" altLang="en-US" dirty="0"/>
+              <a:t>ここでは文単位のことのみを書いているが，文章レベルの</a:t>
+            </a:r>
+            <a:br>
+              <a:rPr lang="en-US" altLang="ja-JP"/>
+            </a:br>
+            <a:r>
+              <a:rPr lang="ja-JP" altLang="en-US"/>
+              <a:t>書き方</a:t>
+            </a:r>
+            <a:r>
+              <a:rPr lang="ja-JP" altLang="en-US" dirty="0"/>
+              <a:t>は別</a:t>
+            </a:r>
+            <a:r>
+              <a:rPr lang="ja-JP" altLang="en-US"/>
+              <a:t>の資料を参照</a:t>
+            </a:r>
+            <a:endParaRPr lang="ja-JP" altLang="en-US" dirty="0"/>
           </a:p>
         </p:txBody>
       </p:sp>
@@ -5131,7 +5164,7 @@
           <a:p>
             <a:r>
               <a:rPr kumimoji="1" lang="ja-JP" altLang="en-US" dirty="0"/>
-              <a:t>工事中</a:t>
+              <a:t>まだ工事中</a:t>
             </a:r>
           </a:p>
         </p:txBody>
@@ -6431,15 +6464,7 @@
             </a:pPr>
             <a:r>
               <a:rPr kumimoji="1" lang="ja-JP" altLang="en-US" dirty="0"/>
-              <a:t>出来上がった英語を </a:t>
-            </a:r>
-            <a:r>
-              <a:rPr kumimoji="1" lang="en-US" altLang="ja-JP" dirty="0"/>
-              <a:t>Google </a:t>
-            </a:r>
-            <a:r>
-              <a:rPr kumimoji="1" lang="ja-JP" altLang="en-US" dirty="0"/>
-              <a:t>翻訳にかけて日本語に戻す</a:t>
+              <a:t>出来上がった英語を逆翻訳して日本語に戻す</a:t>
             </a:r>
             <a:endParaRPr kumimoji="1" lang="en-US" altLang="ja-JP" dirty="0"/>
           </a:p>
@@ -6495,7 +6520,7 @@
           <p:cNvPr id="2" name="タイトル 1">
             <a:extLst>
               <a:ext uri="{FF2B5EF4-FFF2-40B4-BE49-F238E27FC236}">
-                <a16:creationId xmlns:a16="http://schemas.microsoft.com/office/drawing/2014/main" id="{602D00FA-AD08-C1ED-D6AB-E20E96F06AEF}"/>
+                <a16:creationId xmlns:a16="http://schemas.microsoft.com/office/drawing/2014/main" id="{7341EA2B-3240-7B54-DDD2-ED2AF77D53FC}"/>
               </a:ext>
             </a:extLst>
           </p:cNvPr>
@@ -6513,22 +6538,7 @@
           <a:p>
             <a:r>
               <a:rPr kumimoji="1" lang="ja-JP" altLang="en-US" dirty="0"/>
-              <a:t>逆翻訳時になぜ違う翻訳を使うのか</a:t>
-            </a:r>
-            <a:br>
-              <a:rPr kumimoji="1" lang="en-US" altLang="ja-JP" dirty="0"/>
-            </a:br>
-            <a:r>
-              <a:rPr kumimoji="1" lang="ja-JP" altLang="en-US" sz="1800" dirty="0"/>
-              <a:t>（</a:t>
-            </a:r>
-            <a:r>
-              <a:rPr kumimoji="1" lang="en-US" altLang="ja-JP" sz="1800" dirty="0"/>
-              <a:t>2022</a:t>
-            </a:r>
-            <a:r>
-              <a:rPr kumimoji="1" lang="ja-JP" altLang="en-US" sz="1800" dirty="0"/>
-              <a:t>年の場合であり，今後変わる可能性も高い）</a:t>
+              <a:t>出てきた英語の確認と訂正１</a:t>
             </a:r>
           </a:p>
         </p:txBody>
@@ -6538,7 +6548,7 @@
           <p:cNvPr id="3" name="テキスト プレースホルダー 2">
             <a:extLst>
               <a:ext uri="{FF2B5EF4-FFF2-40B4-BE49-F238E27FC236}">
-                <a16:creationId xmlns:a16="http://schemas.microsoft.com/office/drawing/2014/main" id="{4070AA86-D565-9FC0-9EF0-9E1D5F294CD8}"/>
+                <a16:creationId xmlns:a16="http://schemas.microsoft.com/office/drawing/2014/main" id="{C30EC249-85CD-BBED-15C0-7DFAF450D946}"/>
               </a:ext>
             </a:extLst>
           </p:cNvPr>
@@ -6555,102 +6565,63 @@
           <a:lstStyle/>
           <a:p>
             <a:r>
-              <a:rPr kumimoji="1" lang="ja-JP" altLang="en-US" dirty="0"/>
-              <a:t>異なる翻訳エンジンを逆翻訳時に使うことで精度を上げる</a:t>
-            </a:r>
-            <a:endParaRPr kumimoji="1" lang="en-US" altLang="ja-JP" dirty="0"/>
+              <a:rPr kumimoji="1" lang="ja-JP" altLang="en-US" sz="1800" dirty="0"/>
+              <a:t>大抵そのままでは使えない英語が出てくる</a:t>
+            </a:r>
+            <a:endParaRPr kumimoji="1" lang="en-US" altLang="ja-JP" sz="1800" dirty="0"/>
           </a:p>
           <a:p>
             <a:pPr lvl="1"/>
             <a:r>
-              <a:rPr kumimoji="1" lang="ja-JP" altLang="en-US" dirty="0"/>
-              <a:t>同じ翻訳エンジンを使うと，逆翻訳では単に元の文が復元される確率が高い</a:t>
-            </a:r>
-            <a:endParaRPr kumimoji="1" lang="en-US" altLang="ja-JP" dirty="0"/>
+              <a:rPr kumimoji="1" lang="ja-JP" altLang="en-US" sz="1800" dirty="0"/>
+              <a:t>意味がおかしい</a:t>
+            </a:r>
+            <a:endParaRPr kumimoji="1" lang="en-US" altLang="ja-JP" sz="1800" dirty="0"/>
           </a:p>
           <a:p>
             <a:pPr lvl="1"/>
             <a:r>
-              <a:rPr kumimoji="1" lang="ja-JP" altLang="en-US" dirty="0"/>
-              <a:t>同一のネットワークを使って翻訳しているからかもしれない</a:t>
-            </a:r>
-            <a:endParaRPr kumimoji="1" lang="en-US" altLang="ja-JP" dirty="0"/>
-          </a:p>
-          <a:p>
-            <a:r>
-              <a:rPr kumimoji="1" lang="ja-JP" altLang="en-US" dirty="0"/>
-              <a:t>最初の翻訳は </a:t>
-            </a:r>
-            <a:r>
-              <a:rPr kumimoji="1" lang="en-US" altLang="ja-JP" dirty="0"/>
-              <a:t>DeepL </a:t>
-            </a:r>
-            <a:r>
-              <a:rPr kumimoji="1" lang="ja-JP" altLang="en-US" dirty="0"/>
-              <a:t>を使う</a:t>
-            </a:r>
-            <a:endParaRPr kumimoji="1" lang="en-US" altLang="ja-JP" dirty="0"/>
+              <a:rPr kumimoji="1" lang="ja-JP" altLang="en-US" sz="1800" dirty="0"/>
+              <a:t>英語として不自然</a:t>
+            </a:r>
+            <a:endParaRPr kumimoji="1" lang="en-US" altLang="ja-JP" sz="1800" dirty="0"/>
           </a:p>
           <a:p>
             <a:pPr lvl="1"/>
             <a:r>
-              <a:rPr kumimoji="1" lang="ja-JP" altLang="en-US" dirty="0"/>
-              <a:t>現状 </a:t>
-            </a:r>
-            <a:r>
-              <a:rPr kumimoji="1" lang="en-US" altLang="ja-JP" dirty="0"/>
-              <a:t>DeepL </a:t>
-            </a:r>
-            <a:r>
-              <a:rPr kumimoji="1" lang="ja-JP" altLang="en-US" dirty="0"/>
-              <a:t>と </a:t>
-            </a:r>
-            <a:r>
-              <a:rPr kumimoji="1" lang="en-US" altLang="ja-JP" dirty="0"/>
-              <a:t>Google </a:t>
-            </a:r>
-            <a:r>
-              <a:rPr kumimoji="1" lang="ja-JP" altLang="en-US" dirty="0"/>
-              <a:t>翻訳では前者の方が質が高い</a:t>
-            </a:r>
-            <a:endParaRPr kumimoji="1" lang="en-US" altLang="ja-JP" dirty="0"/>
-          </a:p>
-          <a:p>
-            <a:r>
-              <a:rPr lang="ja-JP" altLang="en-US" dirty="0"/>
-              <a:t>逆翻訳は </a:t>
-            </a:r>
-            <a:r>
-              <a:rPr lang="en-US" altLang="ja-JP" dirty="0"/>
-              <a:t>Google </a:t>
-            </a:r>
-            <a:r>
-              <a:rPr lang="ja-JP" altLang="en-US" dirty="0"/>
-              <a:t>翻訳を使う</a:t>
-            </a:r>
-            <a:endParaRPr lang="en-US" altLang="ja-JP" dirty="0"/>
+              <a:rPr kumimoji="1" lang="ja-JP" altLang="en-US" sz="1800" dirty="0"/>
+              <a:t>文がたまに欠落する</a:t>
+            </a:r>
+            <a:endParaRPr kumimoji="1" lang="en-US" altLang="ja-JP" sz="1800" dirty="0"/>
+          </a:p>
+          <a:p>
+            <a:r>
+              <a:rPr kumimoji="1" lang="ja-JP" altLang="en-US" sz="1800" dirty="0"/>
+              <a:t>基本的には，</a:t>
+            </a:r>
+            <a:endParaRPr kumimoji="1" lang="en-US" altLang="ja-JP" sz="1800" dirty="0"/>
           </a:p>
           <a:p>
             <a:pPr lvl="1"/>
             <a:r>
-              <a:rPr lang="en-US" altLang="ja-JP" dirty="0"/>
-              <a:t>DeepL </a:t>
-            </a:r>
-            <a:r>
-              <a:rPr lang="ja-JP" altLang="en-US" dirty="0"/>
-              <a:t>は入力が適当な日本語でも補完して，文法的には正しいが意味的におかしい文を生成しがち</a:t>
-            </a:r>
-            <a:endParaRPr lang="en-US" altLang="ja-JP" dirty="0"/>
+              <a:rPr kumimoji="1" lang="ja-JP" altLang="en-US" sz="1800" dirty="0"/>
+              <a:t>元の日本語を１つずつ書き換える</a:t>
+            </a:r>
+            <a:endParaRPr kumimoji="1" lang="en-US" altLang="ja-JP" sz="1800" dirty="0"/>
+          </a:p>
+          <a:p>
+            <a:pPr lvl="2"/>
+            <a:r>
+              <a:rPr kumimoji="1" lang="ja-JP" altLang="en-US" sz="1800" dirty="0"/>
+              <a:t>この過程で長すぎる文を短くして単純化したり，主語の欠落に気づいて補ったりすることも多い</a:t>
+            </a:r>
+            <a:endParaRPr kumimoji="1" lang="en-US" altLang="ja-JP" sz="1800" dirty="0"/>
           </a:p>
           <a:p>
             <a:pPr lvl="1"/>
             <a:r>
-              <a:rPr kumimoji="1" lang="en-US" altLang="ja-JP" dirty="0"/>
-              <a:t>Google </a:t>
-            </a:r>
-            <a:r>
-              <a:rPr kumimoji="1" lang="ja-JP" altLang="en-US" dirty="0"/>
-              <a:t>翻訳は入力が適当だと翻訳をミスしてくれる</a:t>
+              <a:rPr kumimoji="1" lang="ja-JP" altLang="en-US" sz="1800" dirty="0"/>
+              <a:t>どうしようもないものは英語を直接書く</a:t>
             </a:r>
           </a:p>
         </p:txBody>
@@ -6658,7 +6629,7 @@
     </p:spTree>
     <p:extLst>
       <p:ext uri="{BB962C8B-B14F-4D97-AF65-F5344CB8AC3E}">
-        <p14:creationId xmlns:p14="http://schemas.microsoft.com/office/powerpoint/2010/main" val="2166230868"/>
+        <p14:creationId xmlns:p14="http://schemas.microsoft.com/office/powerpoint/2010/main" val="1683765981"/>
       </p:ext>
     </p:extLst>
   </p:cSld>
@@ -6756,7 +6727,7 @@
           <p:cNvPr id="2" name="タイトル 1">
             <a:extLst>
               <a:ext uri="{FF2B5EF4-FFF2-40B4-BE49-F238E27FC236}">
-                <a16:creationId xmlns:a16="http://schemas.microsoft.com/office/drawing/2014/main" id="{7341EA2B-3240-7B54-DDD2-ED2AF77D53FC}"/>
+                <a16:creationId xmlns:a16="http://schemas.microsoft.com/office/drawing/2014/main" id="{029A745A-C899-0217-F308-813A85480F7E}"/>
               </a:ext>
             </a:extLst>
           </p:cNvPr>
@@ -6774,8 +6745,9 @@
           <a:p>
             <a:r>
               <a:rPr kumimoji="1" lang="ja-JP" altLang="en-US" dirty="0"/>
-              <a:t>出てきた英語の確認と訂正１</a:t>
-            </a:r>
+              <a:t>出てきた英語の確認と訂正２</a:t>
+            </a:r>
+            <a:endParaRPr kumimoji="1" lang="en-US" dirty="0"/>
           </a:p>
         </p:txBody>
       </p:sp>
@@ -6784,7 +6756,7 @@
           <p:cNvPr id="3" name="テキスト プレースホルダー 2">
             <a:extLst>
               <a:ext uri="{FF2B5EF4-FFF2-40B4-BE49-F238E27FC236}">
-                <a16:creationId xmlns:a16="http://schemas.microsoft.com/office/drawing/2014/main" id="{C30EC249-85CD-BBED-15C0-7DFAF450D946}"/>
+                <a16:creationId xmlns:a16="http://schemas.microsoft.com/office/drawing/2014/main" id="{45D0143B-8E19-5080-0DA3-1AE061B61B4B}"/>
               </a:ext>
             </a:extLst>
           </p:cNvPr>
@@ -6802,70 +6774,75 @@
           <a:p>
             <a:r>
               <a:rPr kumimoji="1" lang="ja-JP" altLang="en-US" sz="1800" dirty="0"/>
-              <a:t>大抵そのままでは使えない英語が出てくる</a:t>
+              <a:t>他にも以下を確認する</a:t>
             </a:r>
             <a:endParaRPr kumimoji="1" lang="en-US" altLang="ja-JP" sz="1800" dirty="0"/>
           </a:p>
           <a:p>
-            <a:pPr lvl="1"/>
+            <a:pPr lvl="1">
+              <a:buFont typeface="+mj-lt"/>
+              <a:buAutoNum type="arabicPeriod"/>
+            </a:pPr>
             <a:r>
               <a:rPr kumimoji="1" lang="ja-JP" altLang="en-US" sz="1800" dirty="0"/>
-              <a:t>意味がおかしい</a:t>
+              <a:t>冠詞</a:t>
             </a:r>
             <a:endParaRPr kumimoji="1" lang="en-US" altLang="ja-JP" sz="1800" dirty="0"/>
           </a:p>
           <a:p>
-            <a:pPr lvl="1"/>
+            <a:pPr lvl="1">
+              <a:buFont typeface="+mj-lt"/>
+              <a:buAutoNum type="arabicPeriod"/>
+            </a:pPr>
             <a:r>
               <a:rPr kumimoji="1" lang="ja-JP" altLang="en-US" sz="1800" dirty="0"/>
-              <a:t>英語として不自然</a:t>
+              <a:t>名詞的な動詞の使用</a:t>
             </a:r>
             <a:endParaRPr kumimoji="1" lang="en-US" altLang="ja-JP" sz="1800" dirty="0"/>
           </a:p>
           <a:p>
-            <a:pPr lvl="1"/>
+            <a:pPr lvl="1">
+              <a:buFont typeface="+mj-lt"/>
+              <a:buAutoNum type="arabicPeriod"/>
+            </a:pPr>
             <a:r>
               <a:rPr kumimoji="1" lang="ja-JP" altLang="en-US" sz="1800" dirty="0"/>
-              <a:t>文がたまに欠落する</a:t>
+              <a:t>一般的でない単語</a:t>
+            </a:r>
+            <a:r>
+              <a:rPr kumimoji="1" lang="en-US" altLang="ja-JP" sz="1800" dirty="0"/>
+              <a:t>/</a:t>
+            </a:r>
+            <a:r>
+              <a:rPr kumimoji="1" lang="ja-JP" altLang="en-US" sz="1800" dirty="0"/>
+              <a:t>文法の使用</a:t>
             </a:r>
             <a:endParaRPr kumimoji="1" lang="en-US" altLang="ja-JP" sz="1800" dirty="0"/>
           </a:p>
           <a:p>
-            <a:r>
-              <a:rPr kumimoji="1" lang="ja-JP" altLang="en-US" sz="1800" dirty="0"/>
-              <a:t>基本的には，</a:t>
-            </a:r>
-            <a:endParaRPr kumimoji="1" lang="en-US" altLang="ja-JP" sz="1800" dirty="0"/>
-          </a:p>
-          <a:p>
-            <a:pPr lvl="1"/>
-            <a:r>
-              <a:rPr kumimoji="1" lang="ja-JP" altLang="en-US" sz="1800" dirty="0"/>
-              <a:t>元の日本語を１つずつ書き換える</a:t>
-            </a:r>
-            <a:endParaRPr kumimoji="1" lang="en-US" altLang="ja-JP" sz="1800" dirty="0"/>
-          </a:p>
-          <a:p>
-            <a:pPr lvl="2"/>
-            <a:r>
-              <a:rPr kumimoji="1" lang="ja-JP" altLang="en-US" sz="1800" dirty="0"/>
-              <a:t>この過程で長すぎる文を短くして単純化したり，主語の欠落に気づいて補ったりすることも多い</a:t>
-            </a:r>
-            <a:endParaRPr kumimoji="1" lang="en-US" altLang="ja-JP" sz="1800" dirty="0"/>
-          </a:p>
-          <a:p>
-            <a:pPr lvl="1"/>
-            <a:r>
-              <a:rPr kumimoji="1" lang="ja-JP" altLang="en-US" sz="1800" dirty="0"/>
-              <a:t>どうしようもないものは英語を直接書く</a:t>
-            </a:r>
+            <a:pPr marL="817200" lvl="1" indent="-457200">
+              <a:buFont typeface="+mj-lt"/>
+              <a:buAutoNum type="arabicPeriod"/>
+            </a:pPr>
+            <a:r>
+              <a:rPr kumimoji="1" lang="ja-JP" altLang="en-US" dirty="0"/>
+              <a:t>「各文を適切に接続する」で説明した接続の確認</a:t>
+            </a:r>
+            <a:endParaRPr kumimoji="1" lang="en-US" altLang="ja-JP" dirty="0"/>
+          </a:p>
+          <a:p>
+            <a:r>
+              <a:rPr kumimoji="1" lang="ja-JP" altLang="en-US" dirty="0"/>
+              <a:t>以降でそれぞれを説明</a:t>
+            </a:r>
+            <a:endParaRPr kumimoji="1" lang="en-US" dirty="0"/>
           </a:p>
         </p:txBody>
       </p:sp>
     </p:spTree>
     <p:extLst>
       <p:ext uri="{BB962C8B-B14F-4D97-AF65-F5344CB8AC3E}">
-        <p14:creationId xmlns:p14="http://schemas.microsoft.com/office/powerpoint/2010/main" val="1683765981"/>
+        <p14:creationId xmlns:p14="http://schemas.microsoft.com/office/powerpoint/2010/main" val="2975991491"/>
       </p:ext>
     </p:extLst>
   </p:cSld>
@@ -6905,7 +6882,7 @@
           <p:cNvPr id="2" name="タイトル 1">
             <a:extLst>
               <a:ext uri="{FF2B5EF4-FFF2-40B4-BE49-F238E27FC236}">
-                <a16:creationId xmlns:a16="http://schemas.microsoft.com/office/drawing/2014/main" id="{029A745A-C899-0217-F308-813A85480F7E}"/>
+                <a16:creationId xmlns:a16="http://schemas.microsoft.com/office/drawing/2014/main" id="{5A12D94D-6574-A619-9A03-CF14E23DA425}"/>
               </a:ext>
             </a:extLst>
           </p:cNvPr>
@@ -6923,9 +6900,8 @@
           <a:p>
             <a:r>
               <a:rPr kumimoji="1" lang="ja-JP" altLang="en-US" dirty="0"/>
-              <a:t>出てきた英語の確認と訂正２</a:t>
-            </a:r>
-            <a:endParaRPr kumimoji="1" lang="en-US" dirty="0"/>
+              <a:t>冠詞</a:t>
+            </a:r>
           </a:p>
         </p:txBody>
       </p:sp>
@@ -6934,7 +6910,7 @@
           <p:cNvPr id="3" name="テキスト プレースホルダー 2">
             <a:extLst>
               <a:ext uri="{FF2B5EF4-FFF2-40B4-BE49-F238E27FC236}">
-                <a16:creationId xmlns:a16="http://schemas.microsoft.com/office/drawing/2014/main" id="{45D0143B-8E19-5080-0DA3-1AE061B61B4B}"/>
+                <a16:creationId xmlns:a16="http://schemas.microsoft.com/office/drawing/2014/main" id="{5A756F8D-17E3-B3BC-669A-0013565B8D57}"/>
               </a:ext>
             </a:extLst>
           </p:cNvPr>
@@ -6951,76 +6927,82 @@
           <a:lstStyle/>
           <a:p>
             <a:r>
-              <a:rPr kumimoji="1" lang="ja-JP" altLang="en-US" sz="1800" dirty="0"/>
-              <a:t>他にも以下を確認する</a:t>
-            </a:r>
-            <a:endParaRPr kumimoji="1" lang="en-US" altLang="ja-JP" sz="1800" dirty="0"/>
-          </a:p>
-          <a:p>
-            <a:pPr lvl="1">
-              <a:buFont typeface="+mj-lt"/>
-              <a:buAutoNum type="arabicPeriod"/>
-            </a:pPr>
-            <a:r>
-              <a:rPr kumimoji="1" lang="ja-JP" altLang="en-US" sz="1800" dirty="0"/>
-              <a:t>冠詞</a:t>
-            </a:r>
-            <a:endParaRPr kumimoji="1" lang="en-US" altLang="ja-JP" sz="1800" dirty="0"/>
-          </a:p>
-          <a:p>
-            <a:pPr lvl="1">
-              <a:buFont typeface="+mj-lt"/>
-              <a:buAutoNum type="arabicPeriod"/>
-            </a:pPr>
-            <a:r>
-              <a:rPr kumimoji="1" lang="ja-JP" altLang="en-US" sz="1800" dirty="0"/>
-              <a:t>名詞的な動詞の使用</a:t>
-            </a:r>
-            <a:endParaRPr kumimoji="1" lang="en-US" altLang="ja-JP" sz="1800" dirty="0"/>
-          </a:p>
-          <a:p>
-            <a:pPr lvl="1">
-              <a:buFont typeface="+mj-lt"/>
-              <a:buAutoNum type="arabicPeriod"/>
-            </a:pPr>
-            <a:r>
-              <a:rPr kumimoji="1" lang="ja-JP" altLang="en-US" sz="1800" dirty="0"/>
-              <a:t>一般的でない単語</a:t>
-            </a:r>
-            <a:r>
-              <a:rPr kumimoji="1" lang="en-US" altLang="ja-JP" sz="1800" dirty="0"/>
+              <a:rPr kumimoji="1" lang="ja-JP" altLang="en-US" dirty="0"/>
+              <a:t>冠詞の判断は（この資料の使い方の限りは）自動翻訳には不可能</a:t>
+            </a:r>
+            <a:endParaRPr kumimoji="1" lang="en-US" altLang="ja-JP" dirty="0"/>
+          </a:p>
+          <a:p>
+            <a:pPr lvl="1"/>
+            <a:r>
+              <a:rPr kumimoji="1" lang="ja-JP" altLang="en-US" dirty="0"/>
+              <a:t>定冠詞</a:t>
+            </a:r>
+            <a:r>
+              <a:rPr kumimoji="1" lang="en-US" altLang="ja-JP" dirty="0"/>
               <a:t>/</a:t>
             </a:r>
             <a:r>
-              <a:rPr kumimoji="1" lang="ja-JP" altLang="en-US" sz="1800" dirty="0"/>
-              <a:t>文法の使用</a:t>
-            </a:r>
-            <a:endParaRPr kumimoji="1" lang="en-US" altLang="ja-JP" sz="1800" dirty="0"/>
-          </a:p>
-          <a:p>
-            <a:pPr marL="817200" lvl="1" indent="-457200">
-              <a:buFont typeface="+mj-lt"/>
-              <a:buAutoNum type="arabicPeriod"/>
-            </a:pPr>
-            <a:r>
-              <a:rPr kumimoji="1" lang="ja-JP" altLang="en-US" dirty="0"/>
-              <a:t>「各文を適切に接続する」で説明した接続の確認</a:t>
-            </a:r>
-            <a:endParaRPr kumimoji="1" lang="en-US" altLang="ja-JP" dirty="0"/>
-          </a:p>
-          <a:p>
-            <a:r>
-              <a:rPr kumimoji="1" lang="ja-JP" altLang="en-US" dirty="0"/>
-              <a:t>以降でそれぞれを説明</a:t>
-            </a:r>
-            <a:endParaRPr kumimoji="1" lang="en-US" dirty="0"/>
+              <a:rPr kumimoji="1" lang="ja-JP" altLang="en-US" dirty="0"/>
+              <a:t>不定冠詞</a:t>
+            </a:r>
+            <a:r>
+              <a:rPr kumimoji="1" lang="en-US" altLang="ja-JP" dirty="0"/>
+              <a:t>/</a:t>
+            </a:r>
+            <a:r>
+              <a:rPr kumimoji="1" lang="ja-JP" altLang="en-US" dirty="0"/>
+              <a:t>複数形無冠詞のどれを使うか？</a:t>
+            </a:r>
+            <a:endParaRPr kumimoji="1" lang="en-US" altLang="ja-JP" dirty="0"/>
+          </a:p>
+          <a:p>
+            <a:r>
+              <a:rPr kumimoji="1" lang="ja-JP" altLang="en-US" dirty="0"/>
+              <a:t>その名詞が文脈上で読者から明らかどうかは，わからないから</a:t>
+            </a:r>
+            <a:endParaRPr kumimoji="1" lang="en-US" altLang="ja-JP" dirty="0"/>
+          </a:p>
+          <a:p>
+            <a:pPr lvl="1"/>
+            <a:r>
+              <a:rPr kumimoji="1" lang="ja-JP" altLang="en-US" dirty="0"/>
+              <a:t>そこまでの論文全体の内容から判断する必要がある</a:t>
+            </a:r>
+            <a:endParaRPr kumimoji="1" lang="en-US" altLang="ja-JP" dirty="0"/>
+          </a:p>
+          <a:p>
+            <a:pPr lvl="1"/>
+            <a:r>
+              <a:rPr kumimoji="1" lang="ja-JP" altLang="en-US" dirty="0"/>
+              <a:t>パラグラフ単位の入力のみでは原理的に判断不能</a:t>
+            </a:r>
+            <a:endParaRPr kumimoji="1" lang="en-US" altLang="ja-JP" dirty="0"/>
+          </a:p>
+          <a:p>
+            <a:pPr lvl="2"/>
+            <a:r>
+              <a:rPr kumimoji="1" lang="ja-JP" altLang="en-US" dirty="0"/>
+              <a:t>日本語には冠詞がないので，この情報が大概欠落している</a:t>
+            </a:r>
+            <a:endParaRPr kumimoji="1" lang="en-US" altLang="ja-JP" dirty="0"/>
+          </a:p>
+          <a:p>
+            <a:r>
+              <a:rPr kumimoji="1" lang="ja-JP" altLang="en-US" dirty="0">
+                <a:solidFill>
+                  <a:schemeClr val="accent5"/>
+                </a:solidFill>
+              </a:rPr>
+              <a:t>したがって，冠詞が適切かどうかは全ての文において手動で確認する必要がある</a:t>
+            </a:r>
           </a:p>
         </p:txBody>
       </p:sp>
     </p:spTree>
     <p:extLst>
       <p:ext uri="{BB962C8B-B14F-4D97-AF65-F5344CB8AC3E}">
-        <p14:creationId xmlns:p14="http://schemas.microsoft.com/office/powerpoint/2010/main" val="2975991491"/>
+        <p14:creationId xmlns:p14="http://schemas.microsoft.com/office/powerpoint/2010/main" val="3734920538"/>
       </p:ext>
     </p:extLst>
   </p:cSld>
@@ -7060,7 +7042,7 @@
           <p:cNvPr id="2" name="タイトル 1">
             <a:extLst>
               <a:ext uri="{FF2B5EF4-FFF2-40B4-BE49-F238E27FC236}">
-                <a16:creationId xmlns:a16="http://schemas.microsoft.com/office/drawing/2014/main" id="{5A12D94D-6574-A619-9A03-CF14E23DA425}"/>
+                <a16:creationId xmlns:a16="http://schemas.microsoft.com/office/drawing/2014/main" id="{9417F0C0-1BBB-DA49-E63C-36E80FAEB7B1}"/>
               </a:ext>
             </a:extLst>
           </p:cNvPr>
@@ -7078,7 +7060,7 @@
           <a:p>
             <a:r>
               <a:rPr kumimoji="1" lang="ja-JP" altLang="en-US" dirty="0"/>
-              <a:t>冠詞</a:t>
+              <a:t>名詞的な動詞の使用</a:t>
             </a:r>
           </a:p>
         </p:txBody>
@@ -7088,7 +7070,7 @@
           <p:cNvPr id="3" name="テキスト プレースホルダー 2">
             <a:extLst>
               <a:ext uri="{FF2B5EF4-FFF2-40B4-BE49-F238E27FC236}">
-                <a16:creationId xmlns:a16="http://schemas.microsoft.com/office/drawing/2014/main" id="{5A756F8D-17E3-B3BC-669A-0013565B8D57}"/>
+                <a16:creationId xmlns:a16="http://schemas.microsoft.com/office/drawing/2014/main" id="{B8762508-B3DE-B234-48D7-13A23E76B4E5}"/>
               </a:ext>
             </a:extLst>
           </p:cNvPr>
@@ -7106,81 +7088,92 @@
           <a:p>
             <a:r>
               <a:rPr kumimoji="1" lang="ja-JP" altLang="en-US" dirty="0"/>
-              <a:t>冠詞の判断は（この資料の使い方の限りは）自動翻訳には不可能</a:t>
+              <a:t>「～を行う」から発生しがち</a:t>
             </a:r>
             <a:endParaRPr kumimoji="1" lang="en-US" altLang="ja-JP" dirty="0"/>
           </a:p>
           <a:p>
             <a:pPr lvl="1"/>
-            <a:r>
-              <a:rPr kumimoji="1" lang="ja-JP" altLang="en-US" dirty="0"/>
-              <a:t>定冠詞</a:t>
-            </a:r>
-            <a:r>
-              <a:rPr kumimoji="1" lang="en-US" altLang="ja-JP" dirty="0"/>
-              <a:t>/</a:t>
-            </a:r>
-            <a:r>
-              <a:rPr kumimoji="1" lang="ja-JP" altLang="en-US" dirty="0"/>
-              <a:t>不定冠詞</a:t>
-            </a:r>
-            <a:r>
-              <a:rPr kumimoji="1" lang="en-US" altLang="ja-JP" dirty="0"/>
-              <a:t>/</a:t>
-            </a:r>
-            <a:r>
-              <a:rPr kumimoji="1" lang="ja-JP" altLang="en-US" dirty="0"/>
-              <a:t>複数形無冠詞のどれを使うか？</a:t>
-            </a:r>
-            <a:endParaRPr kumimoji="1" lang="en-US" altLang="ja-JP" dirty="0"/>
-          </a:p>
-          <a:p>
-            <a:r>
-              <a:rPr kumimoji="1" lang="ja-JP" altLang="en-US" dirty="0"/>
-              <a:t>その名詞が文脈上で読者から明らかどうかは，わからないから</a:t>
-            </a:r>
-            <a:endParaRPr kumimoji="1" lang="en-US" altLang="ja-JP" dirty="0"/>
-          </a:p>
-          <a:p>
-            <a:pPr lvl="1"/>
-            <a:r>
-              <a:rPr kumimoji="1" lang="ja-JP" altLang="en-US" dirty="0"/>
-              <a:t>そこまでの論文全体の内容から判断する必要がある</a:t>
-            </a:r>
-            <a:endParaRPr kumimoji="1" lang="en-US" altLang="ja-JP" dirty="0"/>
-          </a:p>
-          <a:p>
-            <a:pPr lvl="1"/>
-            <a:r>
-              <a:rPr kumimoji="1" lang="ja-JP" altLang="en-US" dirty="0"/>
-              <a:t>パラグラフ単位の入力のみでは原理的に判断不能</a:t>
-            </a:r>
-            <a:endParaRPr kumimoji="1" lang="en-US" altLang="ja-JP" dirty="0"/>
-          </a:p>
-          <a:p>
-            <a:pPr lvl="2"/>
-            <a:r>
-              <a:rPr kumimoji="1" lang="ja-JP" altLang="en-US" dirty="0"/>
-              <a:t>日本語には冠詞がないので，この情報が大概欠落している</a:t>
-            </a:r>
-            <a:endParaRPr kumimoji="1" lang="en-US" altLang="ja-JP" dirty="0"/>
-          </a:p>
-          <a:p>
             <a:r>
               <a:rPr kumimoji="1" lang="ja-JP" altLang="en-US" dirty="0">
                 <a:solidFill>
                   <a:schemeClr val="accent5"/>
                 </a:solidFill>
               </a:rPr>
-              <a:t>したがって，冠詞が適切かどうかは全ての文において手動で確認する必要がある</a:t>
-            </a:r>
+              <a:t>たいてい「～する」に変更すれば自然と動詞になる</a:t>
+            </a:r>
+            <a:endParaRPr kumimoji="1" lang="en-US" altLang="ja-JP" dirty="0">
+              <a:solidFill>
+                <a:schemeClr val="accent5"/>
+              </a:solidFill>
+            </a:endParaRPr>
+          </a:p>
+          <a:p>
+            <a:r>
+              <a:rPr kumimoji="1" lang="ja-JP" altLang="en-US" dirty="0"/>
+              <a:t>例：</a:t>
+            </a:r>
+            <a:endParaRPr kumimoji="1" lang="en-US" altLang="ja-JP" dirty="0"/>
+          </a:p>
+          <a:p>
+            <a:pPr lvl="1"/>
+            <a:r>
+              <a:rPr kumimoji="1" lang="ja-JP" altLang="en-US" dirty="0"/>
+              <a:t>このプログラムはその値の大きさの判断を行う →</a:t>
+            </a:r>
+            <a:br>
+              <a:rPr kumimoji="1" lang="en-US" altLang="ja-JP" dirty="0"/>
+            </a:br>
+            <a:r>
+              <a:rPr kumimoji="1" lang="en-US" altLang="ja-JP" dirty="0"/>
+              <a:t>This program </a:t>
+            </a:r>
+            <a:r>
+              <a:rPr kumimoji="1" lang="en-US" altLang="ja-JP" dirty="0">
+                <a:solidFill>
+                  <a:schemeClr val="accent5"/>
+                </a:solidFill>
+              </a:rPr>
+              <a:t>makes a determination </a:t>
+            </a:r>
+            <a:r>
+              <a:rPr kumimoji="1" lang="en-US" altLang="ja-JP" dirty="0"/>
+              <a:t>of the magnitude of the value.</a:t>
+            </a:r>
+          </a:p>
+          <a:p>
+            <a:pPr lvl="1"/>
+            <a:r>
+              <a:rPr kumimoji="1" lang="ja-JP" altLang="en-US" dirty="0"/>
+              <a:t>このプログラムはその値の大きさを判断する →</a:t>
+            </a:r>
+            <a:br>
+              <a:rPr kumimoji="1" lang="en-US" altLang="ja-JP" dirty="0"/>
+            </a:br>
+            <a:r>
+              <a:rPr kumimoji="1" lang="en-US" altLang="ja-JP" dirty="0"/>
+              <a:t>This program </a:t>
+            </a:r>
+            <a:r>
+              <a:rPr kumimoji="1" lang="en-US" altLang="ja-JP" dirty="0">
+                <a:solidFill>
+                  <a:schemeClr val="accent5"/>
+                </a:solidFill>
+              </a:rPr>
+              <a:t>determines</a:t>
+            </a:r>
+            <a:r>
+              <a:rPr kumimoji="1" lang="en-US" altLang="ja-JP" dirty="0"/>
+              <a:t> the magnitude of the value.</a:t>
+            </a:r>
+            <a:endParaRPr kumimoji="1" lang="ja-JP" altLang="en-US" dirty="0"/>
           </a:p>
         </p:txBody>
       </p:sp>
     </p:spTree>
     <p:extLst>
       <p:ext uri="{BB962C8B-B14F-4D97-AF65-F5344CB8AC3E}">
-        <p14:creationId xmlns:p14="http://schemas.microsoft.com/office/powerpoint/2010/main" val="3734920538"/>
+        <p14:creationId xmlns:p14="http://schemas.microsoft.com/office/powerpoint/2010/main" val="1822882613"/>
       </p:ext>
     </p:extLst>
   </p:cSld>
@@ -7220,7 +7213,7 @@
           <p:cNvPr id="2" name="タイトル 1">
             <a:extLst>
               <a:ext uri="{FF2B5EF4-FFF2-40B4-BE49-F238E27FC236}">
-                <a16:creationId xmlns:a16="http://schemas.microsoft.com/office/drawing/2014/main" id="{9417F0C0-1BBB-DA49-E63C-36E80FAEB7B1}"/>
+                <a16:creationId xmlns:a16="http://schemas.microsoft.com/office/drawing/2014/main" id="{CEE9364F-4718-BA29-5985-5FAD68F073E7}"/>
               </a:ext>
             </a:extLst>
           </p:cNvPr>
@@ -7238,7 +7231,15 @@
           <a:p>
             <a:r>
               <a:rPr kumimoji="1" lang="ja-JP" altLang="en-US" dirty="0"/>
-              <a:t>名詞的な動詞の使用</a:t>
+              <a:t>一般的でない単語</a:t>
+            </a:r>
+            <a:r>
+              <a:rPr kumimoji="1" lang="en-US" altLang="ja-JP" dirty="0"/>
+              <a:t>/</a:t>
+            </a:r>
+            <a:r>
+              <a:rPr kumimoji="1" lang="ja-JP" altLang="en-US" dirty="0"/>
+              <a:t>文法の使用</a:t>
             </a:r>
           </a:p>
         </p:txBody>
@@ -7248,7 +7249,7 @@
           <p:cNvPr id="3" name="テキスト プレースホルダー 2">
             <a:extLst>
               <a:ext uri="{FF2B5EF4-FFF2-40B4-BE49-F238E27FC236}">
-                <a16:creationId xmlns:a16="http://schemas.microsoft.com/office/drawing/2014/main" id="{B8762508-B3DE-B234-48D7-13A23E76B4E5}"/>
+                <a16:creationId xmlns:a16="http://schemas.microsoft.com/office/drawing/2014/main" id="{76559CBE-BEF8-1CFF-770A-95AB7AF7D31C}"/>
               </a:ext>
             </a:extLst>
           </p:cNvPr>
@@ -7265,22 +7266,38 @@
           <a:lstStyle/>
           <a:p>
             <a:r>
-              <a:rPr kumimoji="1" lang="ja-JP" altLang="en-US" dirty="0"/>
-              <a:t>「～を行う」から発生しがち</a:t>
-            </a:r>
-            <a:endParaRPr kumimoji="1" lang="en-US" altLang="ja-JP" dirty="0"/>
+              <a:rPr kumimoji="1" lang="ja-JP" altLang="en-US" sz="1800" dirty="0"/>
+              <a:t>見たこともない単語や用法が出てきた場合，なにかおかしい可能性が高い</a:t>
+            </a:r>
+            <a:endParaRPr kumimoji="1" lang="en-US" altLang="ja-JP" sz="1800" dirty="0"/>
           </a:p>
           <a:p>
             <a:pPr lvl="1"/>
             <a:r>
-              <a:rPr kumimoji="1" lang="ja-JP" altLang="en-US" dirty="0">
+              <a:rPr kumimoji="1" lang="ja-JP" altLang="en-US" sz="1800" dirty="0"/>
+              <a:t>うまく訳せなかったための翻訳エンジンの悲鳴な可能性がある</a:t>
+            </a:r>
+            <a:endParaRPr kumimoji="1" lang="en-US" altLang="ja-JP" sz="1800" dirty="0"/>
+          </a:p>
+          <a:p>
+            <a:pPr lvl="1"/>
+            <a:r>
+              <a:rPr kumimoji="1" lang="ja-JP" altLang="en-US" sz="1800" dirty="0"/>
+              <a:t>文自体の複雑さや使用している元の単語を見直した方がよい</a:t>
+            </a:r>
+            <a:endParaRPr kumimoji="1" lang="en-US" altLang="ja-JP" sz="1800" dirty="0"/>
+          </a:p>
+          <a:p>
+            <a:pPr lvl="1"/>
+            <a:r>
+              <a:rPr kumimoji="1" lang="ja-JP" altLang="en-US" sz="1800" dirty="0">
                 <a:solidFill>
                   <a:schemeClr val="accent5"/>
                 </a:solidFill>
               </a:rPr>
-              <a:t>たいてい「～する」に変更すれば自然と動詞になる</a:t>
-            </a:r>
-            <a:endParaRPr kumimoji="1" lang="en-US" altLang="ja-JP" dirty="0">
+              <a:t>基本的には日本語の時点で短く簡潔に書けば，ほとんどこれは起きない</a:t>
+            </a:r>
+            <a:endParaRPr kumimoji="1" lang="en-US" altLang="ja-JP" sz="1800" dirty="0">
               <a:solidFill>
                 <a:schemeClr val="accent5"/>
               </a:solidFill>
@@ -7288,70 +7305,44 @@
           </a:p>
           <a:p>
             <a:r>
-              <a:rPr kumimoji="1" lang="ja-JP" altLang="en-US" dirty="0"/>
-              <a:t>例：</a:t>
-            </a:r>
-            <a:endParaRPr kumimoji="1" lang="en-US" altLang="ja-JP" dirty="0"/>
+              <a:rPr lang="en-US" altLang="ja-JP" sz="1800" dirty="0"/>
+              <a:t>Google</a:t>
+            </a:r>
+            <a:r>
+              <a:rPr lang="ja-JP" altLang="en-US" sz="1800" dirty="0"/>
+              <a:t> 検索にかけて確認</a:t>
+            </a:r>
+            <a:endParaRPr lang="en-US" altLang="ja-JP" sz="1800" dirty="0"/>
           </a:p>
           <a:p>
             <a:pPr lvl="1"/>
             <a:r>
-              <a:rPr kumimoji="1" lang="ja-JP" altLang="en-US" dirty="0"/>
-              <a:t>このプログラムはその値の大きさの判断を行う →</a:t>
-            </a:r>
-            <a:br>
-              <a:rPr kumimoji="1" lang="en-US" altLang="ja-JP" dirty="0"/>
-            </a:br>
-            <a:r>
-              <a:rPr kumimoji="1" lang="en-US" altLang="ja-JP" dirty="0"/>
-              <a:t>This program </a:t>
-            </a:r>
-            <a:r>
-              <a:rPr kumimoji="1" lang="en-US" altLang="ja-JP" dirty="0">
-                <a:solidFill>
-                  <a:schemeClr val="accent5"/>
-                </a:solidFill>
-              </a:rPr>
-              <a:t>makes a determination </a:t>
-            </a:r>
-            <a:r>
-              <a:rPr kumimoji="1" lang="en-US" altLang="ja-JP" dirty="0"/>
-              <a:t>of the magnitude of the value.</a:t>
-            </a:r>
+              <a:rPr lang="ja-JP" altLang="en-US" sz="1800" dirty="0"/>
+              <a:t>日本人が書いたものが多くヒットした場合，日本人がやりがちな不自然な表現の可能性もある</a:t>
+            </a:r>
+            <a:endParaRPr kumimoji="1" lang="en-US" altLang="ja-JP" sz="1800" dirty="0"/>
+          </a:p>
+          <a:p>
+            <a:r>
+              <a:rPr kumimoji="1" lang="ja-JP" altLang="en-US" sz="1800" dirty="0"/>
+              <a:t>論文は基本的に中学で習う程度の英語で書けるし，そうすべき</a:t>
+            </a:r>
+            <a:endParaRPr kumimoji="1" lang="en-US" altLang="ja-JP" sz="1800" dirty="0"/>
           </a:p>
           <a:p>
             <a:pPr lvl="1"/>
             <a:r>
-              <a:rPr kumimoji="1" lang="ja-JP" altLang="en-US" dirty="0"/>
-              <a:t>このプログラムはその値の大きさを判断する →</a:t>
-            </a:r>
-            <a:br>
-              <a:rPr kumimoji="1" lang="en-US" altLang="ja-JP" dirty="0"/>
-            </a:br>
-            <a:r>
-              <a:rPr kumimoji="1" lang="en-US" altLang="ja-JP" dirty="0"/>
-              <a:t>This program </a:t>
-            </a:r>
-            <a:r>
-              <a:rPr kumimoji="1" lang="en-US" altLang="ja-JP" dirty="0">
-                <a:solidFill>
-                  <a:schemeClr val="accent5"/>
-                </a:solidFill>
-              </a:rPr>
-              <a:t>determines</a:t>
-            </a:r>
-            <a:r>
-              <a:rPr kumimoji="1" lang="en-US" altLang="ja-JP" dirty="0"/>
-              <a:t> the magnitude of the value.</a:t>
-            </a:r>
-            <a:endParaRPr kumimoji="1" lang="ja-JP" altLang="en-US" dirty="0"/>
+              <a:rPr kumimoji="1" lang="ja-JP" altLang="en-US" sz="1800" dirty="0"/>
+              <a:t>専門用語以外は，可能な限り平易で簡潔な表現を用いる</a:t>
+            </a:r>
+            <a:endParaRPr kumimoji="1" lang="en-US" altLang="ja-JP" sz="1800" dirty="0"/>
           </a:p>
         </p:txBody>
       </p:sp>
     </p:spTree>
     <p:extLst>
       <p:ext uri="{BB962C8B-B14F-4D97-AF65-F5344CB8AC3E}">
-        <p14:creationId xmlns:p14="http://schemas.microsoft.com/office/powerpoint/2010/main" val="1822882613"/>
+        <p14:creationId xmlns:p14="http://schemas.microsoft.com/office/powerpoint/2010/main" val="2943080080"/>
       </p:ext>
     </p:extLst>
   </p:cSld>
@@ -7391,7 +7382,7 @@
           <p:cNvPr id="2" name="タイトル 1">
             <a:extLst>
               <a:ext uri="{FF2B5EF4-FFF2-40B4-BE49-F238E27FC236}">
-                <a16:creationId xmlns:a16="http://schemas.microsoft.com/office/drawing/2014/main" id="{CEE9364F-4718-BA29-5985-5FAD68F073E7}"/>
+                <a16:creationId xmlns:a16="http://schemas.microsoft.com/office/drawing/2014/main" id="{3637115E-E577-E6D7-8FF9-B2C0B5824569}"/>
               </a:ext>
             </a:extLst>
           </p:cNvPr>
@@ -7409,16 +7400,9 @@
           <a:p>
             <a:r>
               <a:rPr kumimoji="1" lang="ja-JP" altLang="en-US" dirty="0"/>
-              <a:t>一般的でない単語</a:t>
-            </a:r>
-            <a:r>
-              <a:rPr kumimoji="1" lang="en-US" altLang="ja-JP" dirty="0"/>
-              <a:t>/</a:t>
-            </a:r>
-            <a:r>
-              <a:rPr kumimoji="1" lang="ja-JP" altLang="en-US" dirty="0"/>
-              <a:t>文法の使用</a:t>
-            </a:r>
+              <a:t>「各文を適切に接続する」で説明した接続の確認</a:t>
+            </a:r>
+            <a:endParaRPr kumimoji="1" lang="en-US" dirty="0"/>
           </a:p>
         </p:txBody>
       </p:sp>
@@ -7427,7 +7411,7 @@
           <p:cNvPr id="3" name="テキスト プレースホルダー 2">
             <a:extLst>
               <a:ext uri="{FF2B5EF4-FFF2-40B4-BE49-F238E27FC236}">
-                <a16:creationId xmlns:a16="http://schemas.microsoft.com/office/drawing/2014/main" id="{76559CBE-BEF8-1CFF-770A-95AB7AF7D31C}"/>
+                <a16:creationId xmlns:a16="http://schemas.microsoft.com/office/drawing/2014/main" id="{EA7C5E12-1D05-6BA3-7C99-6DCBEE0DA691}"/>
               </a:ext>
             </a:extLst>
           </p:cNvPr>
@@ -7444,83 +7428,79 @@
           <a:lstStyle/>
           <a:p>
             <a:r>
-              <a:rPr kumimoji="1" lang="ja-JP" altLang="en-US" sz="1800" dirty="0"/>
-              <a:t>見たこともない単語や用法が出てきた場合，なにかおかしい可能性が高い</a:t>
-            </a:r>
-            <a:endParaRPr kumimoji="1" lang="en-US" altLang="ja-JP" sz="1800" dirty="0"/>
+              <a:rPr kumimoji="1" lang="ja-JP" altLang="en-US" dirty="0"/>
+              <a:t>接続をよくするために，文の頭の方に既出の単語を持ってくる</a:t>
+            </a:r>
+            <a:endParaRPr kumimoji="1" lang="en-US" altLang="ja-JP" dirty="0"/>
+          </a:p>
+          <a:p>
+            <a:r>
+              <a:rPr kumimoji="1" lang="ja-JP" altLang="en-US" dirty="0"/>
+              <a:t>方針：</a:t>
+            </a:r>
+            <a:endParaRPr kumimoji="1" lang="en-US" altLang="ja-JP" dirty="0"/>
           </a:p>
           <a:p>
             <a:pPr lvl="1"/>
             <a:r>
-              <a:rPr kumimoji="1" lang="ja-JP" altLang="en-US" sz="1800" dirty="0"/>
-              <a:t>うまく訳せなかったための翻訳エンジンの悲鳴な可能性がある</a:t>
-            </a:r>
-            <a:endParaRPr kumimoji="1" lang="en-US" altLang="ja-JP" sz="1800" dirty="0"/>
+              <a:rPr kumimoji="1" lang="ja-JP" altLang="en-US" dirty="0"/>
+              <a:t>日本語自体を書き換えてなんとかする</a:t>
+            </a:r>
+            <a:endParaRPr kumimoji="1" lang="en-US" altLang="ja-JP" dirty="0"/>
+          </a:p>
+          <a:p>
+            <a:pPr lvl="2"/>
+            <a:r>
+              <a:rPr kumimoji="1" lang="ja-JP" altLang="en-US" dirty="0"/>
+              <a:t>短い文であれば，比較的語順が維持される</a:t>
+            </a:r>
+            <a:br>
+              <a:rPr kumimoji="1" lang="en-US" altLang="ja-JP" dirty="0"/>
+            </a:br>
+            <a:endParaRPr kumimoji="1" lang="en-US" altLang="ja-JP" dirty="0"/>
           </a:p>
           <a:p>
             <a:pPr lvl="1"/>
             <a:r>
-              <a:rPr kumimoji="1" lang="ja-JP" altLang="en-US" sz="1800" dirty="0"/>
-              <a:t>文自体の複雑さや使用している元の単語を見直した方がよい</a:t>
-            </a:r>
-            <a:endParaRPr kumimoji="1" lang="en-US" altLang="ja-JP" sz="1800" dirty="0"/>
-          </a:p>
-          <a:p>
-            <a:pPr lvl="1"/>
-            <a:r>
-              <a:rPr kumimoji="1" lang="ja-JP" altLang="en-US" sz="1800" dirty="0">
-                <a:solidFill>
-                  <a:schemeClr val="accent5"/>
-                </a:solidFill>
-              </a:rPr>
-              <a:t>基本的には日本語の時点で短く簡潔に書けば，ほとんどこれは起きない</a:t>
-            </a:r>
-            <a:endParaRPr kumimoji="1" lang="en-US" altLang="ja-JP" sz="1800" dirty="0">
-              <a:solidFill>
-                <a:schemeClr val="accent5"/>
-              </a:solidFill>
-            </a:endParaRPr>
-          </a:p>
-          <a:p>
-            <a:r>
-              <a:rPr lang="en-US" altLang="ja-JP" sz="1800" dirty="0"/>
-              <a:t>Google</a:t>
-            </a:r>
-            <a:r>
-              <a:rPr lang="ja-JP" altLang="en-US" sz="1800" dirty="0"/>
-              <a:t> 検索にかけて確認</a:t>
-            </a:r>
-            <a:endParaRPr lang="en-US" altLang="ja-JP" sz="1800" dirty="0"/>
-          </a:p>
-          <a:p>
-            <a:pPr lvl="1"/>
-            <a:r>
-              <a:rPr lang="ja-JP" altLang="en-US" sz="1800" dirty="0"/>
-              <a:t>日本人が書いたものが多くヒットした場合，日本人がやりがちな不自然な表現の可能性もある</a:t>
-            </a:r>
-            <a:endParaRPr kumimoji="1" lang="en-US" altLang="ja-JP" sz="1800" dirty="0"/>
-          </a:p>
-          <a:p>
-            <a:r>
-              <a:rPr kumimoji="1" lang="ja-JP" altLang="en-US" sz="1800" dirty="0"/>
-              <a:t>論文は基本的に中学で習う程度の英語で書けるし，そうすべき</a:t>
-            </a:r>
-            <a:endParaRPr kumimoji="1" lang="en-US" altLang="ja-JP" sz="1800" dirty="0"/>
-          </a:p>
-          <a:p>
-            <a:pPr lvl="1"/>
-            <a:r>
-              <a:rPr kumimoji="1" lang="ja-JP" altLang="en-US" sz="1800" dirty="0"/>
-              <a:t>専門用語以外は，可能な限り平易で簡潔な表現を用いる</a:t>
-            </a:r>
-            <a:endParaRPr kumimoji="1" lang="en-US" altLang="ja-JP" sz="1800" dirty="0"/>
+              <a:rPr kumimoji="1" lang="en-US" altLang="ja-JP" dirty="0"/>
+              <a:t>DeepL </a:t>
+            </a:r>
+            <a:r>
+              <a:rPr kumimoji="1" lang="ja-JP" altLang="en-US" dirty="0"/>
+              <a:t>の単語選択機能を使う</a:t>
+            </a:r>
+            <a:endParaRPr kumimoji="1" lang="en-US" altLang="ja-JP" dirty="0"/>
+          </a:p>
+          <a:p>
+            <a:pPr lvl="2"/>
+            <a:r>
+              <a:rPr kumimoji="1" lang="ja-JP" altLang="en-US" dirty="0"/>
+              <a:t>翻訳後の単語をクリックすると，別の候補が出てくる</a:t>
+            </a:r>
+            <a:endParaRPr kumimoji="1" lang="en-US" altLang="ja-JP" dirty="0"/>
+          </a:p>
+          <a:p>
+            <a:pPr lvl="2"/>
+            <a:r>
+              <a:rPr kumimoji="1" lang="ja-JP" altLang="en-US" dirty="0"/>
+              <a:t>候補をクリックすると，後続の翻訳が対応して書き換わる</a:t>
+            </a:r>
+            <a:endParaRPr kumimoji="1" lang="en-US" altLang="ja-JP" dirty="0"/>
+          </a:p>
+          <a:p>
+            <a:pPr lvl="2"/>
+            <a:r>
+              <a:rPr kumimoji="1" lang="ja-JP" altLang="en-US" dirty="0"/>
+              <a:t>これを使って接続の良い候補を選ぶ</a:t>
+            </a:r>
+            <a:endParaRPr kumimoji="1" lang="en-US" dirty="0"/>
           </a:p>
         </p:txBody>
       </p:sp>
     </p:spTree>
     <p:extLst>
       <p:ext uri="{BB962C8B-B14F-4D97-AF65-F5344CB8AC3E}">
-        <p14:creationId xmlns:p14="http://schemas.microsoft.com/office/powerpoint/2010/main" val="2943080080"/>
+        <p14:creationId xmlns:p14="http://schemas.microsoft.com/office/powerpoint/2010/main" val="1900962925"/>
       </p:ext>
     </p:extLst>
   </p:cSld>
@@ -7557,10 +7537,10 @@
       </p:grpSpPr>
       <p:sp>
         <p:nvSpPr>
-          <p:cNvPr id="2" name="タイトル 1">
+          <p:cNvPr id="4" name="タイトル 3">
             <a:extLst>
               <a:ext uri="{FF2B5EF4-FFF2-40B4-BE49-F238E27FC236}">
-                <a16:creationId xmlns:a16="http://schemas.microsoft.com/office/drawing/2014/main" id="{3637115E-E577-E6D7-8FF9-B2C0B5824569}"/>
+                <a16:creationId xmlns:a16="http://schemas.microsoft.com/office/drawing/2014/main" id="{6F8815B0-4243-7B07-F4BD-1C0A780A3E0B}"/>
               </a:ext>
             </a:extLst>
           </p:cNvPr>
@@ -7578,121 +7558,46 @@
           <a:p>
             <a:r>
               <a:rPr kumimoji="1" lang="ja-JP" altLang="en-US" dirty="0"/>
-              <a:t>「各文を適切に接続する」で説明した接続の確認</a:t>
-            </a:r>
-            <a:endParaRPr kumimoji="1" lang="en-US" dirty="0"/>
-          </a:p>
-        </p:txBody>
-      </p:sp>
-      <p:sp>
-        <p:nvSpPr>
-          <p:cNvPr id="3" name="テキスト プレースホルダー 2">
-            <a:extLst>
-              <a:ext uri="{FF2B5EF4-FFF2-40B4-BE49-F238E27FC236}">
-                <a16:creationId xmlns:a16="http://schemas.microsoft.com/office/drawing/2014/main" id="{EA7C5E12-1D05-6BA3-7C99-6DCBEE0DA691}"/>
-              </a:ext>
-            </a:extLst>
-          </p:cNvPr>
-          <p:cNvSpPr>
-            <a:spLocks noGrp="1"/>
-          </p:cNvSpPr>
-          <p:nvPr>
-            <p:ph type="body" sz="quarter" idx="10"/>
-          </p:nvPr>
-        </p:nvSpPr>
-        <p:spPr/>
-        <p:txBody>
-          <a:bodyPr/>
-          <a:lstStyle/>
-          <a:p>
-            <a:r>
-              <a:rPr kumimoji="1" lang="ja-JP" altLang="en-US" dirty="0"/>
-              <a:t>接続をよくするために，文の頭の方に既出の単語を持ってくる</a:t>
-            </a:r>
-            <a:endParaRPr kumimoji="1" lang="en-US" altLang="ja-JP" dirty="0"/>
-          </a:p>
-          <a:p>
-            <a:r>
-              <a:rPr kumimoji="1" lang="ja-JP" altLang="en-US" dirty="0"/>
-              <a:t>方針：</a:t>
-            </a:r>
-            <a:endParaRPr kumimoji="1" lang="en-US" altLang="ja-JP" dirty="0"/>
-          </a:p>
-          <a:p>
-            <a:pPr lvl="1"/>
-            <a:r>
-              <a:rPr kumimoji="1" lang="ja-JP" altLang="en-US" dirty="0"/>
-              <a:t>日本語自体を書き換えてなんとかする</a:t>
-            </a:r>
-            <a:endParaRPr kumimoji="1" lang="en-US" altLang="ja-JP" dirty="0"/>
-          </a:p>
-          <a:p>
-            <a:pPr lvl="2"/>
-            <a:r>
-              <a:rPr kumimoji="1" lang="ja-JP" altLang="en-US" dirty="0"/>
-              <a:t>短い文であれば，比較的語順が維持される</a:t>
-            </a:r>
-            <a:br>
+              <a:t>言語</a:t>
+            </a:r>
+            <a:r>
+              <a:rPr lang="ja-JP" altLang="en-US" dirty="0"/>
+              <a:t>生成 </a:t>
+            </a:r>
+            <a:r>
+              <a:rPr lang="en-US" altLang="ja-JP" dirty="0"/>
+              <a:t>AI</a:t>
+            </a:r>
+            <a:r>
               <a:rPr kumimoji="1" lang="en-US" altLang="ja-JP" dirty="0"/>
-            </a:br>
-            <a:endParaRPr kumimoji="1" lang="en-US" altLang="ja-JP" dirty="0"/>
-          </a:p>
-          <a:p>
-            <a:pPr lvl="1"/>
-            <a:r>
-              <a:rPr kumimoji="1" lang="en-US" altLang="ja-JP" dirty="0"/>
-              <a:t>DeepL </a:t>
-            </a:r>
-            <a:r>
-              <a:rPr kumimoji="1" lang="ja-JP" altLang="en-US" dirty="0"/>
-              <a:t>の単語選択機能を使う</a:t>
-            </a:r>
-            <a:endParaRPr kumimoji="1" lang="en-US" altLang="ja-JP" dirty="0"/>
-          </a:p>
-          <a:p>
-            <a:pPr lvl="2"/>
-            <a:r>
-              <a:rPr kumimoji="1" lang="ja-JP" altLang="en-US" dirty="0"/>
-              <a:t>翻訳後の単語をクリックすると，別の候補が出てくる</a:t>
-            </a:r>
-            <a:endParaRPr kumimoji="1" lang="en-US" altLang="ja-JP" dirty="0"/>
-          </a:p>
-          <a:p>
-            <a:pPr lvl="2"/>
-            <a:r>
-              <a:rPr kumimoji="1" lang="ja-JP" altLang="en-US" dirty="0"/>
-              <a:t>候補をクリックすると，後続の翻訳が対応して書き換わる</a:t>
-            </a:r>
-            <a:endParaRPr kumimoji="1" lang="en-US" altLang="ja-JP" dirty="0"/>
-          </a:p>
-          <a:p>
-            <a:pPr lvl="2"/>
-            <a:r>
-              <a:rPr kumimoji="1" lang="ja-JP" altLang="en-US" dirty="0"/>
-              <a:t>これを使って接続の良い候補を選ぶ</a:t>
-            </a:r>
-            <a:endParaRPr kumimoji="1" lang="en-US" dirty="0"/>
+              <a:t> </a:t>
+            </a:r>
+            <a:r>
+              <a:rPr kumimoji="1" lang="ja-JP" altLang="en-US" dirty="0"/>
+              <a:t>を使っ</a:t>
+            </a:r>
+            <a:r>
+              <a:rPr lang="ja-JP" altLang="en-US" dirty="0"/>
+              <a:t>た</a:t>
+            </a:r>
+            <a:r>
+              <a:rPr kumimoji="1" lang="ja-JP" altLang="en-US" dirty="0"/>
+              <a:t>英文の校正</a:t>
+            </a:r>
+            <a:endParaRPr kumimoji="1" lang="en-US" altLang="ja-JP" dirty="0"/>
           </a:p>
         </p:txBody>
       </p:sp>
     </p:spTree>
     <p:extLst>
       <p:ext uri="{BB962C8B-B14F-4D97-AF65-F5344CB8AC3E}">
-        <p14:creationId xmlns:p14="http://schemas.microsoft.com/office/powerpoint/2010/main" val="1900962925"/>
+        <p14:creationId xmlns:p14="http://schemas.microsoft.com/office/powerpoint/2010/main" val="574937999"/>
       </p:ext>
     </p:extLst>
   </p:cSld>
   <p:clrMapOvr>
     <a:masterClrMapping/>
   </p:clrMapOvr>
-  <mc:AlternateContent xmlns:mc="http://schemas.openxmlformats.org/markup-compatibility/2006" xmlns:p14="http://schemas.microsoft.com/office/powerpoint/2010/main">
-    <mc:Choice Requires="p14">
-      <p:transition p14:dur="10"/>
-    </mc:Choice>
-    <mc:Fallback xmlns="">
-      <p:transition/>
-    </mc:Fallback>
-  </mc:AlternateContent>
 </p:sld>
 </file>
 
@@ -7718,7 +7623,7 @@
           <p:cNvPr id="4" name="タイトル 3">
             <a:extLst>
               <a:ext uri="{FF2B5EF4-FFF2-40B4-BE49-F238E27FC236}">
-                <a16:creationId xmlns:a16="http://schemas.microsoft.com/office/drawing/2014/main" id="{6F8815B0-4243-7B07-F4BD-1C0A780A3E0B}"/>
+                <a16:creationId xmlns:a16="http://schemas.microsoft.com/office/drawing/2014/main" id="{D7822D4E-F254-1FF6-4CD6-0B65B2D6BFE9}"/>
               </a:ext>
             </a:extLst>
           </p:cNvPr>
@@ -7736,21 +7641,114 @@
           <a:p>
             <a:r>
               <a:rPr lang="ja-JP" altLang="en-US" dirty="0"/>
-              <a:t>文法チェッカーによる確認</a:t>
-            </a:r>
+              <a:t>英文校正について</a:t>
+            </a:r>
+            <a:endParaRPr lang="en-US" dirty="0"/>
+          </a:p>
+        </p:txBody>
+      </p:sp>
+      <p:sp>
+        <p:nvSpPr>
+          <p:cNvPr id="5" name="テキスト プレースホルダー 4">
+            <a:extLst>
+              <a:ext uri="{FF2B5EF4-FFF2-40B4-BE49-F238E27FC236}">
+                <a16:creationId xmlns:a16="http://schemas.microsoft.com/office/drawing/2014/main" id="{5591299F-3C44-9260-09AD-482B6F05CF1D}"/>
+              </a:ext>
+            </a:extLst>
+          </p:cNvPr>
+          <p:cNvSpPr>
+            <a:spLocks noGrp="1"/>
+          </p:cNvSpPr>
+          <p:nvPr>
+            <p:ph type="body" sz="quarter" idx="10"/>
+          </p:nvPr>
+        </p:nvSpPr>
+        <p:spPr/>
+        <p:txBody>
+          <a:bodyPr/>
+          <a:lstStyle/>
+          <a:p>
+            <a:r>
+              <a:rPr lang="ja-JP" altLang="en-US" sz="1800" dirty="0"/>
+              <a:t>出来上がった英文の完成度を上げる</a:t>
+            </a:r>
+            <a:endParaRPr lang="en-US" altLang="ja-JP" sz="1800" dirty="0"/>
+          </a:p>
+          <a:p>
+            <a:pPr lvl="1"/>
+            <a:r>
+              <a:rPr lang="ja-JP" altLang="en-US" sz="1800" dirty="0"/>
+              <a:t>文法的に正しくても，不自然な言い回しになっている事などがある</a:t>
+            </a:r>
+            <a:endParaRPr lang="en-US" altLang="ja-JP" sz="1800" dirty="0"/>
+          </a:p>
+          <a:p>
+            <a:r>
+              <a:rPr lang="ja-JP" altLang="en-US" sz="1800" dirty="0"/>
+              <a:t>もうあまり校正業者に出す利点はないと思う（</a:t>
+            </a:r>
+            <a:r>
+              <a:rPr lang="en-US" altLang="ja-JP" sz="1800" dirty="0"/>
+              <a:t>2023</a:t>
+            </a:r>
+            <a:r>
+              <a:rPr lang="ja-JP" altLang="en-US" sz="1800" dirty="0"/>
+              <a:t>年現在）</a:t>
+            </a:r>
+            <a:endParaRPr lang="en-US" altLang="ja-JP" sz="1800" dirty="0"/>
+          </a:p>
+          <a:p>
+            <a:pPr lvl="1"/>
+            <a:r>
+              <a:rPr lang="ja-JP" altLang="en-US" sz="1800" dirty="0"/>
+              <a:t>生成 </a:t>
+            </a:r>
+            <a:r>
+              <a:rPr lang="en-US" altLang="ja-JP" sz="1800" dirty="0"/>
+              <a:t>AI </a:t>
+            </a:r>
+            <a:r>
+              <a:rPr lang="ja-JP" altLang="en-US" sz="1800" dirty="0"/>
+              <a:t>の返してくる英文の質がもう十分に高い</a:t>
+            </a:r>
+            <a:endParaRPr lang="en-US" altLang="ja-JP" sz="1800" dirty="0"/>
+          </a:p>
+          <a:p>
+            <a:pPr lvl="1"/>
+            <a:r>
+              <a:rPr lang="ja-JP" altLang="en-US" sz="1800" dirty="0"/>
+              <a:t>生成 </a:t>
+            </a:r>
+            <a:r>
+              <a:rPr lang="en-US" altLang="ja-JP" sz="1800" dirty="0"/>
+              <a:t>AI </a:t>
+            </a:r>
+            <a:r>
+              <a:rPr lang="ja-JP" altLang="en-US" sz="1800" dirty="0"/>
+              <a:t>なら微調整や細かい注文がその場でできる</a:t>
+            </a:r>
+            <a:endParaRPr lang="en-US" altLang="ja-JP" sz="1800" dirty="0"/>
           </a:p>
         </p:txBody>
       </p:sp>
     </p:spTree>
     <p:extLst>
       <p:ext uri="{BB962C8B-B14F-4D97-AF65-F5344CB8AC3E}">
-        <p14:creationId xmlns:p14="http://schemas.microsoft.com/office/powerpoint/2010/main" val="4024130881"/>
+        <p14:creationId xmlns:p14="http://schemas.microsoft.com/office/powerpoint/2010/main" val="126608420"/>
       </p:ext>
     </p:extLst>
   </p:cSld>
   <p:clrMapOvr>
     <a:masterClrMapping/>
   </p:clrMapOvr>
+  <mc:AlternateContent xmlns:mc="http://schemas.openxmlformats.org/markup-compatibility/2006" xmlns:p14="http://schemas.microsoft.com/office/powerpoint/2010/main">
+    <mc:Choice Requires="p14">
+      <p:transition p14:dur="10"/>
+    </mc:Choice>
+    <mc:Fallback xmlns="">
+      <p:transition/>
+    </mc:Fallback>
+  </mc:AlternateContent>
 </p:sld>
 </file>
 
@@ -7773,10 +7771,10 @@
       </p:grpSpPr>
       <p:sp>
         <p:nvSpPr>
-          <p:cNvPr id="4" name="タイトル 3">
+          <p:cNvPr id="2" name="タイトル 1">
             <a:extLst>
               <a:ext uri="{FF2B5EF4-FFF2-40B4-BE49-F238E27FC236}">
-                <a16:creationId xmlns:a16="http://schemas.microsoft.com/office/drawing/2014/main" id="{6C423390-69C4-FBFF-2641-53532CF918C8}"/>
+                <a16:creationId xmlns:a16="http://schemas.microsoft.com/office/drawing/2014/main" id="{222AE2EE-0688-2BE5-5B33-675F6806063C}"/>
               </a:ext>
             </a:extLst>
           </p:cNvPr>
@@ -7793,18 +7791,26 @@
           <a:lstStyle/>
           <a:p>
             <a:r>
-              <a:rPr lang="ja-JP" altLang="en-US" dirty="0"/>
-              <a:t>文法チェッカーによる確認</a:t>
-            </a:r>
-          </a:p>
-        </p:txBody>
-      </p:sp>
-      <p:sp>
-        <p:nvSpPr>
-          <p:cNvPr id="5" name="テキスト プレースホルダー 4">
+              <a:rPr kumimoji="1" lang="ja-JP" altLang="en-US" dirty="0"/>
+              <a:t>最初から生成 </a:t>
+            </a:r>
+            <a:r>
+              <a:rPr kumimoji="1" lang="en-US" altLang="ja-JP" dirty="0"/>
+              <a:t>AI </a:t>
+            </a:r>
+            <a:r>
+              <a:rPr kumimoji="1" lang="ja-JP" altLang="en-US" dirty="0"/>
+              <a:t>で翻訳しては駄目なのか？</a:t>
+            </a:r>
+          </a:p>
+        </p:txBody>
+      </p:sp>
+      <p:sp>
+        <p:nvSpPr>
+          <p:cNvPr id="3" name="テキスト プレースホルダー 2">
             <a:extLst>
               <a:ext uri="{FF2B5EF4-FFF2-40B4-BE49-F238E27FC236}">
-                <a16:creationId xmlns:a16="http://schemas.microsoft.com/office/drawing/2014/main" id="{0A07C90D-5F55-4BA0-E29C-6AC2654528F3}"/>
+                <a16:creationId xmlns:a16="http://schemas.microsoft.com/office/drawing/2014/main" id="{B726B4FD-AD2D-408C-5CDA-A50DA62C6829}"/>
               </a:ext>
             </a:extLst>
           </p:cNvPr>
@@ -7821,102 +7827,72 @@
           <a:lstStyle/>
           <a:p>
             <a:r>
-              <a:rPr lang="ja-JP" altLang="en-US" sz="1800" dirty="0"/>
-              <a:t>手直しの際に文法の誤りが入ることは多いため，確認は必須</a:t>
-            </a:r>
-            <a:endParaRPr lang="en-US" altLang="ja-JP" sz="1800" dirty="0"/>
+              <a:rPr kumimoji="1" lang="ja-JP" altLang="en-US" dirty="0"/>
+              <a:t>そもそも日本語の時点で曖昧であったり情報が欠けているなど，問題があることが大半</a:t>
+            </a:r>
+            <a:endParaRPr kumimoji="1" lang="en-US" altLang="ja-JP" dirty="0"/>
+          </a:p>
+          <a:p>
+            <a:r>
+              <a:rPr kumimoji="1" lang="ja-JP" altLang="en-US" dirty="0"/>
+              <a:t>これらは </a:t>
+            </a:r>
+            <a:r>
+              <a:rPr kumimoji="1" lang="en-US" altLang="ja-JP" dirty="0" err="1"/>
+              <a:t>DeepL</a:t>
+            </a:r>
+            <a:r>
+              <a:rPr kumimoji="1" lang="en-US" altLang="ja-JP" dirty="0"/>
+              <a:t> </a:t>
+            </a:r>
+            <a:r>
+              <a:rPr kumimoji="1" lang="ja-JP" altLang="en-US" dirty="0"/>
+              <a:t>で日本語を修正しながら直した方が良い</a:t>
+            </a:r>
+            <a:endParaRPr kumimoji="1" lang="en-US" altLang="ja-JP" dirty="0"/>
           </a:p>
           <a:p>
             <a:pPr lvl="1"/>
             <a:r>
-              <a:rPr lang="ja-JP" altLang="en-US" sz="1800" dirty="0"/>
-              <a:t>下記のツールを使うと良い</a:t>
-            </a:r>
-            <a:endParaRPr lang="en-US" altLang="ja-JP" sz="1800" dirty="0"/>
-          </a:p>
-          <a:p>
-            <a:pPr lvl="2"/>
-            <a:r>
-              <a:rPr lang="en-US" altLang="ja-JP" sz="1800" dirty="0" err="1"/>
-              <a:t>Grammaly</a:t>
-            </a:r>
-            <a:endParaRPr lang="en-US" altLang="ja-JP" sz="1800" dirty="0"/>
-          </a:p>
-          <a:p>
-            <a:pPr lvl="2"/>
-            <a:r>
-              <a:rPr lang="en-US" altLang="ja-JP" sz="1800" dirty="0" err="1"/>
-              <a:t>Writeful</a:t>
-            </a:r>
-            <a:endParaRPr lang="en-US" altLang="ja-JP" sz="1800" dirty="0"/>
+              <a:rPr lang="ja-JP" altLang="en-US" dirty="0"/>
+              <a:t>現状の </a:t>
+            </a:r>
+            <a:r>
+              <a:rPr lang="en-US" altLang="ja-JP" dirty="0"/>
+              <a:t>ChatGPT </a:t>
+            </a:r>
+            <a:r>
+              <a:rPr lang="ja-JP" altLang="en-US" dirty="0"/>
+              <a:t>ではレスポンスが悪すぎる（</a:t>
+            </a:r>
+            <a:r>
+              <a:rPr lang="en-US" altLang="ja-JP" dirty="0"/>
+              <a:t>2023</a:t>
+            </a:r>
+            <a:r>
+              <a:rPr lang="ja-JP" altLang="en-US" dirty="0"/>
+              <a:t>年現在）</a:t>
+            </a:r>
+            <a:endParaRPr lang="en-US" altLang="ja-JP" dirty="0"/>
           </a:p>
           <a:p>
             <a:pPr lvl="1"/>
             <a:r>
-              <a:rPr lang="en-US" altLang="ja-JP" sz="1800" dirty="0"/>
-              <a:t>Overleaf </a:t>
-            </a:r>
-            <a:r>
-              <a:rPr lang="ja-JP" altLang="en-US" sz="1800" dirty="0"/>
-              <a:t>を使っているなら，どちらのツールも自動で対応している</a:t>
-            </a:r>
-            <a:endParaRPr lang="en-US" altLang="ja-JP" sz="1800" dirty="0"/>
-          </a:p>
-          <a:p>
-            <a:r>
-              <a:rPr lang="ja-JP" altLang="en-US" sz="1800" dirty="0"/>
-              <a:t>ただし，指摘してくる事項は機械的に適用してはいけない</a:t>
-            </a:r>
-            <a:endParaRPr lang="en-US" altLang="ja-JP" sz="1800" dirty="0"/>
-          </a:p>
-          <a:p>
-            <a:pPr lvl="1"/>
-            <a:r>
-              <a:rPr lang="ja-JP" altLang="en-US" sz="1800" dirty="0"/>
-              <a:t>特に冠詞など，文脈から判断されるものは指摘が間違っている事も多い</a:t>
-            </a:r>
-          </a:p>
-        </p:txBody>
-      </p:sp>
-      <p:sp>
-        <p:nvSpPr>
-          <p:cNvPr id="2" name="スライド番号プレースホルダー 1">
-            <a:extLst>
-              <a:ext uri="{FF2B5EF4-FFF2-40B4-BE49-F238E27FC236}">
-                <a16:creationId xmlns:a16="http://schemas.microsoft.com/office/drawing/2014/main" id="{88AF93A0-907F-352A-97CC-3E4F9E14ABEE}"/>
-              </a:ext>
-            </a:extLst>
-          </p:cNvPr>
-          <p:cNvSpPr>
-            <a:spLocks noGrp="1"/>
-          </p:cNvSpPr>
-          <p:nvPr>
-            <p:ph type="sldNum" sz="quarter" idx="4294967295"/>
-          </p:nvPr>
-        </p:nvSpPr>
-        <p:spPr>
-          <a:xfrm>
-            <a:off x="8531225" y="6308725"/>
-            <a:ext cx="612775" cy="549275"/>
-          </a:xfrm>
-        </p:spPr>
-        <p:txBody>
-          <a:bodyPr/>
-          <a:lstStyle/>
-          <a:p>
-            <a:fld id="{D2D8002D-B5B0-4BAC-B1F6-782DDCCE6D9C}" type="slidenum">
-              <a:rPr kumimoji="1" lang="ja-JP" altLang="en-US" smtClean="0"/>
-              <a:pPr/>
-              <a:t>37</a:t>
-            </a:fld>
-            <a:endParaRPr kumimoji="1" lang="ja-JP" altLang="en-US"/>
+              <a:rPr kumimoji="1" lang="ja-JP" altLang="en-US" dirty="0"/>
+              <a:t>リアルタイム</a:t>
+            </a:r>
+            <a:r>
+              <a:rPr lang="ja-JP" altLang="en-US" dirty="0"/>
+              <a:t>で修正結果が見れた方がやりやすい</a:t>
+            </a:r>
+            <a:endParaRPr kumimoji="1" lang="ja-JP" altLang="en-US" dirty="0"/>
           </a:p>
         </p:txBody>
       </p:sp>
     </p:spTree>
     <p:extLst>
       <p:ext uri="{BB962C8B-B14F-4D97-AF65-F5344CB8AC3E}">
-        <p14:creationId xmlns:p14="http://schemas.microsoft.com/office/powerpoint/2010/main" val="869398461"/>
+        <p14:creationId xmlns:p14="http://schemas.microsoft.com/office/powerpoint/2010/main" val="3074079359"/>
       </p:ext>
     </p:extLst>
   </p:cSld>
@@ -7956,7 +7932,7 @@
           <p:cNvPr id="2" name="タイトル 1">
             <a:extLst>
               <a:ext uri="{FF2B5EF4-FFF2-40B4-BE49-F238E27FC236}">
-                <a16:creationId xmlns:a16="http://schemas.microsoft.com/office/drawing/2014/main" id="{1A38D290-8A50-0AEC-BF9B-7F0BD18F3EA7}"/>
+                <a16:creationId xmlns:a16="http://schemas.microsoft.com/office/drawing/2014/main" id="{28C7B579-49E2-802B-2428-2D03557380B1}"/>
               </a:ext>
             </a:extLst>
           </p:cNvPr>
@@ -7973,9 +7949,10 @@
           <a:lstStyle/>
           <a:p>
             <a:r>
-              <a:rPr kumimoji="1" lang="ja-JP" altLang="en-US" dirty="0"/>
-              <a:t>スペルチェックについて</a:t>
-            </a:r>
+              <a:rPr kumimoji="1" lang="en-US" altLang="ja-JP" dirty="0"/>
+              <a:t>ChatGPT</a:t>
+            </a:r>
+            <a:endParaRPr kumimoji="1" lang="ja-JP" altLang="en-US" dirty="0"/>
           </a:p>
         </p:txBody>
       </p:sp>
@@ -7984,7 +7961,7 @@
           <p:cNvPr id="3" name="テキスト プレースホルダー 2">
             <a:extLst>
               <a:ext uri="{FF2B5EF4-FFF2-40B4-BE49-F238E27FC236}">
-                <a16:creationId xmlns:a16="http://schemas.microsoft.com/office/drawing/2014/main" id="{247B98D5-4504-8842-18A1-062F8DEC3DA1}"/>
+                <a16:creationId xmlns:a16="http://schemas.microsoft.com/office/drawing/2014/main" id="{BA58B522-E13E-8B39-84AA-931558EBC6C7}"/>
               </a:ext>
             </a:extLst>
           </p:cNvPr>
@@ -7995,55 +7972,57 @@
             <p:ph type="body" sz="quarter" idx="10"/>
           </p:nvPr>
         </p:nvSpPr>
-        <p:spPr/>
+        <p:spPr>
+          <a:xfrm>
+            <a:off x="611956" y="1088974"/>
+            <a:ext cx="8280092" cy="2970033"/>
+          </a:xfrm>
+        </p:spPr>
         <p:txBody>
           <a:bodyPr/>
           <a:lstStyle/>
           <a:p>
             <a:r>
-              <a:rPr kumimoji="1" lang="ja-JP" altLang="en-US" dirty="0"/>
-              <a:t>スペルチェック付きのエディタを使うこと</a:t>
-            </a:r>
-            <a:endParaRPr kumimoji="1" lang="en-US" altLang="ja-JP" dirty="0"/>
-          </a:p>
-          <a:p>
-            <a:pPr lvl="1"/>
-            <a:r>
-              <a:rPr lang="en-US" altLang="ja-JP" dirty="0" err="1"/>
-              <a:t>vscode</a:t>
-            </a:r>
-            <a:r>
-              <a:rPr lang="en-US" altLang="ja-JP" dirty="0"/>
-              <a:t> </a:t>
-            </a:r>
-            <a:r>
-              <a:rPr lang="ja-JP" altLang="en-US" dirty="0"/>
-              <a:t>ならアドオンを入れる</a:t>
-            </a:r>
-            <a:endParaRPr lang="en-US" altLang="ja-JP" dirty="0"/>
-          </a:p>
-          <a:p>
-            <a:pPr lvl="1"/>
-            <a:r>
-              <a:rPr kumimoji="1" lang="en-US" altLang="ja-JP" dirty="0"/>
-              <a:t>overleaf </a:t>
-            </a:r>
-            <a:r>
-              <a:rPr kumimoji="1" lang="ja-JP" altLang="en-US" dirty="0"/>
-              <a:t>なら最初からついている</a:t>
-            </a:r>
-            <a:endParaRPr kumimoji="1" lang="en-US" altLang="ja-JP" dirty="0"/>
-          </a:p>
-          <a:p>
-            <a:r>
-              <a:rPr kumimoji="1" lang="ja-JP" altLang="en-US" dirty="0">
+              <a:rPr kumimoji="1" lang="ja-JP" altLang="en-US" b="1" dirty="0">
                 <a:solidFill>
                   <a:schemeClr val="accent5"/>
                 </a:solidFill>
               </a:rPr>
-              <a:t>赤線が引かれたら無視しない</a:t>
-            </a:r>
-            <a:endParaRPr kumimoji="1" lang="en-US" altLang="ja-JP" dirty="0">
+              <a:t>必ず課金版の </a:t>
+            </a:r>
+            <a:r>
+              <a:rPr kumimoji="1" lang="en-US" altLang="ja-JP" b="1" dirty="0">
+                <a:solidFill>
+                  <a:schemeClr val="accent5"/>
+                </a:solidFill>
+              </a:rPr>
+              <a:t>ChatGPT Ver 4 </a:t>
+            </a:r>
+            <a:r>
+              <a:rPr kumimoji="1" lang="ja-JP" altLang="en-US" b="1" dirty="0">
+                <a:solidFill>
+                  <a:schemeClr val="accent5"/>
+                </a:solidFill>
+              </a:rPr>
+              <a:t>を使うこと（</a:t>
+            </a:r>
+            <a:r>
+              <a:rPr kumimoji="1" lang="en-US" altLang="ja-JP" b="1" dirty="0">
+                <a:solidFill>
+                  <a:schemeClr val="accent5"/>
+                </a:solidFill>
+              </a:rPr>
+              <a:t>2023</a:t>
+            </a:r>
+            <a:r>
+              <a:rPr kumimoji="1" lang="ja-JP" altLang="en-US" b="1" dirty="0">
+                <a:solidFill>
+                  <a:schemeClr val="accent5"/>
+                </a:solidFill>
+              </a:rPr>
+              <a:t>年現在）</a:t>
+            </a:r>
+            <a:endParaRPr kumimoji="1" lang="en-US" altLang="ja-JP" b="1" dirty="0">
               <a:solidFill>
                 <a:schemeClr val="accent5"/>
               </a:solidFill>
@@ -8052,16 +8031,180 @@
           <a:p>
             <a:pPr lvl="1"/>
             <a:r>
-              <a:rPr kumimoji="1" lang="ja-JP" altLang="en-US" dirty="0"/>
-              <a:t>固有名詞で正しい場合は全部辞書に登録する</a:t>
-            </a:r>
+              <a:rPr lang="ja-JP" altLang="en-US" dirty="0"/>
+              <a:t>無課金の </a:t>
+            </a:r>
+            <a:r>
+              <a:rPr lang="en-US" altLang="ja-JP" dirty="0"/>
+              <a:t>Ver 3.5 </a:t>
+            </a:r>
+            <a:r>
+              <a:rPr lang="ja-JP" altLang="en-US" dirty="0"/>
+              <a:t>とは全く出力の質が異なる</a:t>
+            </a:r>
+            <a:endParaRPr lang="en-US" altLang="ja-JP" dirty="0"/>
+          </a:p>
+          <a:p>
+            <a:pPr lvl="1"/>
+            <a:r>
+              <a:rPr kumimoji="1" lang="ja-JP" altLang="en-US" dirty="0"/>
+              <a:t>以降で説明するやり方は </a:t>
+            </a:r>
+            <a:r>
+              <a:rPr kumimoji="1" lang="en-US" altLang="ja-JP" dirty="0"/>
+              <a:t>Ver 3.5 </a:t>
+            </a:r>
+            <a:r>
+              <a:rPr kumimoji="1" lang="ja-JP" altLang="en-US" dirty="0"/>
+              <a:t>ではほぼ機能しない</a:t>
+            </a:r>
+            <a:endParaRPr kumimoji="1" lang="en-US" altLang="ja-JP" dirty="0"/>
+          </a:p>
+          <a:p>
+            <a:r>
+              <a:rPr lang="ja-JP" altLang="en-US" b="1" dirty="0">
+                <a:solidFill>
+                  <a:schemeClr val="accent5"/>
+                </a:solidFill>
+              </a:rPr>
+              <a:t>設定で学習を無効化すること</a:t>
+            </a:r>
+            <a:endParaRPr lang="en-US" altLang="ja-JP" b="1" dirty="0">
+              <a:solidFill>
+                <a:schemeClr val="accent5"/>
+              </a:solidFill>
+            </a:endParaRPr>
+          </a:p>
+          <a:p>
+            <a:pPr lvl="1"/>
+            <a:r>
+              <a:rPr kumimoji="1" lang="ja-JP" altLang="en-US" dirty="0"/>
+              <a:t>以下の「</a:t>
+            </a:r>
+            <a:r>
+              <a:rPr kumimoji="1" lang="en-US" altLang="ja-JP" dirty="0"/>
+              <a:t>Chat history &amp; training</a:t>
+            </a:r>
+            <a:r>
+              <a:rPr kumimoji="1" lang="ja-JP" altLang="en-US" dirty="0"/>
+              <a:t>」を無効にする</a:t>
+            </a:r>
+            <a:endParaRPr kumimoji="1" lang="en-US" altLang="ja-JP" dirty="0"/>
+          </a:p>
+          <a:p>
+            <a:pPr lvl="1"/>
+            <a:r>
+              <a:rPr kumimoji="1" lang="ja-JP" altLang="en-US" dirty="0"/>
+              <a:t>これは有料版でないと使えない</a:t>
+            </a:r>
+            <a:endParaRPr kumimoji="1" lang="en-US" altLang="ja-JP" dirty="0"/>
+          </a:p>
+          <a:p>
+            <a:pPr lvl="1"/>
+            <a:r>
+              <a:rPr lang="ja-JP" altLang="en-US" dirty="0"/>
+              <a:t>無効にしないと入力した原稿が勝手に使われかねない</a:t>
+            </a:r>
+            <a:endParaRPr lang="en-US" altLang="ja-JP" dirty="0"/>
+          </a:p>
+        </p:txBody>
+      </p:sp>
+      <p:pic>
+        <p:nvPicPr>
+          <p:cNvPr id="5" name="図 4">
+            <a:extLst>
+              <a:ext uri="{FF2B5EF4-FFF2-40B4-BE49-F238E27FC236}">
+                <a16:creationId xmlns:a16="http://schemas.microsoft.com/office/drawing/2014/main" id="{84987663-0FBC-08DA-BAC5-A5AFF43ACEC4}"/>
+              </a:ext>
+            </a:extLst>
+          </p:cNvPr>
+          <p:cNvPicPr>
+            <a:picLocks noChangeAspect="1"/>
+          </p:cNvPicPr>
+          <p:nvPr/>
+        </p:nvPicPr>
+        <p:blipFill>
+          <a:blip r:embed="rId2"/>
+          <a:stretch>
+            <a:fillRect/>
+          </a:stretch>
+        </p:blipFill>
+        <p:spPr>
+          <a:xfrm>
+            <a:off x="1511966" y="4329010"/>
+            <a:ext cx="6375728" cy="2362321"/>
+          </a:xfrm>
+          <a:prstGeom prst="rect">
+            <a:avLst/>
+          </a:prstGeom>
+        </p:spPr>
+      </p:pic>
+      <p:sp>
+        <p:nvSpPr>
+          <p:cNvPr id="6" name="四角形: 角を丸くする 5">
+            <a:extLst>
+              <a:ext uri="{FF2B5EF4-FFF2-40B4-BE49-F238E27FC236}">
+                <a16:creationId xmlns:a16="http://schemas.microsoft.com/office/drawing/2014/main" id="{0E18F4FF-656C-2BDA-13C4-AEA823FD6F12}"/>
+              </a:ext>
+            </a:extLst>
+          </p:cNvPr>
+          <p:cNvSpPr/>
+          <p:nvPr/>
+        </p:nvSpPr>
+        <p:spPr bwMode="auto">
+          <a:xfrm>
+            <a:off x="7092028" y="5049019"/>
+            <a:ext cx="900010" cy="360004"/>
+          </a:xfrm>
+          <a:prstGeom prst="roundRect">
+            <a:avLst/>
+          </a:prstGeom>
+          <a:noFill/>
+          <a:ln w="38100">
+            <a:headEnd/>
+            <a:tailEnd type="triangle" w="sm" len="med"/>
+          </a:ln>
+        </p:spPr>
+        <p:style>
+          <a:lnRef idx="2">
+            <a:schemeClr val="accent6"/>
+          </a:lnRef>
+          <a:fillRef idx="1">
+            <a:schemeClr val="lt1"/>
+          </a:fillRef>
+          <a:effectRef idx="0">
+            <a:schemeClr val="accent6"/>
+          </a:effectRef>
+          <a:fontRef idx="minor">
+            <a:schemeClr val="dk1"/>
+          </a:fontRef>
+        </p:style>
+        <p:txBody>
+          <a:bodyPr rot="0" spcFirstLastPara="0" vertOverflow="overflow" horzOverflow="overflow" vert="horz" wrap="none" lIns="91440" tIns="45720" rIns="91440" bIns="45720" numCol="1" spcCol="0" rtlCol="0" fromWordArt="0" anchor="ctr" anchorCtr="0" forceAA="0" compatLnSpc="1">
+            <a:prstTxWarp prst="textNoShape">
+              <a:avLst/>
+            </a:prstTxWarp>
+            <a:noAutofit/>
+          </a:bodyPr>
+          <a:lstStyle/>
+          <a:p>
+            <a:pPr algn="ctr"/>
+            <a:endParaRPr kumimoji="1" lang="ja-JP" altLang="en-US" dirty="0">
+              <a:solidFill>
+                <a:schemeClr val="tx1">
+                  <a:lumMod val="75000"/>
+                  <a:lumOff val="25000"/>
+                </a:schemeClr>
+              </a:solidFill>
+              <a:latin typeface="+mn-ea"/>
+            </a:endParaRPr>
           </a:p>
         </p:txBody>
       </p:sp>
     </p:spTree>
     <p:extLst>
       <p:ext uri="{BB962C8B-B14F-4D97-AF65-F5344CB8AC3E}">
-        <p14:creationId xmlns:p14="http://schemas.microsoft.com/office/powerpoint/2010/main" val="627829571"/>
+        <p14:creationId xmlns:p14="http://schemas.microsoft.com/office/powerpoint/2010/main" val="2243273457"/>
       </p:ext>
     </p:extLst>
   </p:cSld>
@@ -8098,10 +8241,10 @@
       </p:grpSpPr>
       <p:sp>
         <p:nvSpPr>
-          <p:cNvPr id="4" name="タイトル 3">
+          <p:cNvPr id="2" name="タイトル 1">
             <a:extLst>
               <a:ext uri="{FF2B5EF4-FFF2-40B4-BE49-F238E27FC236}">
-                <a16:creationId xmlns:a16="http://schemas.microsoft.com/office/drawing/2014/main" id="{6F8815B0-4243-7B07-F4BD-1C0A780A3E0B}"/>
+                <a16:creationId xmlns:a16="http://schemas.microsoft.com/office/drawing/2014/main" id="{A6B453B1-8A5C-9D45-0BF1-FF344B93ECDC}"/>
               </a:ext>
             </a:extLst>
           </p:cNvPr>
@@ -8118,22 +8261,117 @@
           <a:lstStyle/>
           <a:p>
             <a:r>
+              <a:rPr kumimoji="1" lang="ja-JP" altLang="en-US" dirty="0"/>
+              <a:t>手順</a:t>
+            </a:r>
+          </a:p>
+        </p:txBody>
+      </p:sp>
+      <p:sp>
+        <p:nvSpPr>
+          <p:cNvPr id="3" name="テキスト プレースホルダー 2">
+            <a:extLst>
+              <a:ext uri="{FF2B5EF4-FFF2-40B4-BE49-F238E27FC236}">
+                <a16:creationId xmlns:a16="http://schemas.microsoft.com/office/drawing/2014/main" id="{66CF3E8B-F982-2A1B-A21D-FF66C2E04DC0}"/>
+              </a:ext>
+            </a:extLst>
+          </p:cNvPr>
+          <p:cNvSpPr>
+            <a:spLocks noGrp="1"/>
+          </p:cNvSpPr>
+          <p:nvPr>
+            <p:ph type="body" sz="quarter" idx="10"/>
+          </p:nvPr>
+        </p:nvSpPr>
+        <p:spPr/>
+        <p:txBody>
+          <a:bodyPr/>
+          <a:lstStyle/>
+          <a:p>
+            <a:r>
+              <a:rPr kumimoji="1" lang="ja-JP" altLang="en-US" dirty="0"/>
+              <a:t>使用プロンプト例：</a:t>
+            </a:r>
+            <a:br>
+              <a:rPr kumimoji="1" lang="en-US" altLang="ja-JP" dirty="0"/>
+            </a:br>
+            <a:br>
+              <a:rPr kumimoji="1" lang="en-US" altLang="ja-JP" dirty="0"/>
+            </a:br>
+            <a:r>
+              <a:rPr kumimoji="1" lang="ja-JP" altLang="en-US" dirty="0"/>
+              <a:t>以降で入力する文章はコンピュータサイエンス分野における論文原稿の一部ですが，説明の論理や英語について不自然な点がもしあれば，その理由を日本語で指摘して，英文を訂正してください．</a:t>
+            </a:r>
+            <a:endParaRPr kumimoji="1" lang="en-US" altLang="ja-JP" dirty="0"/>
+          </a:p>
+          <a:p>
+            <a:r>
               <a:rPr lang="ja-JP" altLang="en-US" dirty="0"/>
-              <a:t>英文校正について</a:t>
-            </a:r>
+              <a:t>基本的な進め方：</a:t>
+            </a:r>
+            <a:endParaRPr lang="en-US" altLang="ja-JP" dirty="0"/>
+          </a:p>
+          <a:p>
+            <a:pPr marL="817200" lvl="1" indent="-457200">
+              <a:buFont typeface="+mj-lt"/>
+              <a:buAutoNum type="arabicPeriod"/>
+            </a:pPr>
+            <a:r>
+              <a:rPr kumimoji="1" lang="ja-JP" altLang="en-US" dirty="0"/>
+              <a:t>上記プロンプトを入力</a:t>
+            </a:r>
+            <a:endParaRPr kumimoji="1" lang="en-US" altLang="ja-JP" dirty="0"/>
+          </a:p>
+          <a:p>
+            <a:pPr marL="817200" lvl="1" indent="-457200">
+              <a:buFont typeface="+mj-lt"/>
+              <a:buAutoNum type="arabicPeriod"/>
+            </a:pPr>
+            <a:r>
+              <a:rPr lang="ja-JP" altLang="en-US" dirty="0">
+                <a:solidFill>
+                  <a:schemeClr val="accent5"/>
+                </a:solidFill>
+              </a:rPr>
+              <a:t>パラグラフ単位で</a:t>
+            </a:r>
+            <a:r>
+              <a:rPr lang="ja-JP" altLang="en-US" dirty="0"/>
+              <a:t>英文を入力して訂正を確認</a:t>
+            </a:r>
+            <a:endParaRPr lang="en-US" altLang="ja-JP" dirty="0"/>
+          </a:p>
+          <a:p>
+            <a:pPr marL="817200" lvl="1" indent="-457200">
+              <a:buFont typeface="+mj-lt"/>
+              <a:buAutoNum type="arabicPeriod"/>
+            </a:pPr>
+            <a:r>
+              <a:rPr kumimoji="1" lang="ja-JP" altLang="en-US" dirty="0"/>
+              <a:t>修正文がまとめて出ない場合があるので，必要に応じて「修正文全体を示してください」と指示する</a:t>
+            </a:r>
+            <a:endParaRPr kumimoji="1" lang="en-US" altLang="ja-JP" dirty="0"/>
           </a:p>
         </p:txBody>
       </p:sp>
     </p:spTree>
     <p:extLst>
       <p:ext uri="{BB962C8B-B14F-4D97-AF65-F5344CB8AC3E}">
-        <p14:creationId xmlns:p14="http://schemas.microsoft.com/office/powerpoint/2010/main" val="1290229056"/>
+        <p14:creationId xmlns:p14="http://schemas.microsoft.com/office/powerpoint/2010/main" val="3962535696"/>
       </p:ext>
     </p:extLst>
   </p:cSld>
   <p:clrMapOvr>
     <a:masterClrMapping/>
   </p:clrMapOvr>
+  <mc:AlternateContent xmlns:mc="http://schemas.openxmlformats.org/markup-compatibility/2006" xmlns:p14="http://schemas.microsoft.com/office/powerpoint/2010/main">
+    <mc:Choice Requires="p14">
+      <p:transition p14:dur="10"/>
+    </mc:Choice>
+    <mc:Fallback xmlns="">
+      <p:transition/>
+    </mc:Fallback>
+  </mc:AlternateContent>
 </p:sld>
 </file>
 
@@ -8283,6 +8521,21 @@
               <a:t>用の英文法チェッカー拡張）</a:t>
             </a:r>
             <a:endParaRPr lang="en-US" altLang="ja-JP" dirty="0"/>
+          </a:p>
+          <a:p>
+            <a:pPr lvl="1"/>
+            <a:r>
+              <a:rPr lang="ja-JP" altLang="en-US" dirty="0"/>
+              <a:t>校正</a:t>
+            </a:r>
+            <a:endParaRPr lang="en-US" altLang="ja-JP" dirty="0"/>
+          </a:p>
+          <a:p>
+            <a:pPr lvl="2"/>
+            <a:r>
+              <a:rPr lang="en-US" altLang="ja-JP" dirty="0"/>
+              <a:t>ChatGPT</a:t>
+            </a:r>
           </a:p>
           <a:p>
             <a:pPr lvl="1"/>
@@ -8338,10 +8591,10 @@
       </p:grpSpPr>
       <p:sp>
         <p:nvSpPr>
-          <p:cNvPr id="4" name="タイトル 3">
+          <p:cNvPr id="2" name="タイトル 1">
             <a:extLst>
               <a:ext uri="{FF2B5EF4-FFF2-40B4-BE49-F238E27FC236}">
-                <a16:creationId xmlns:a16="http://schemas.microsoft.com/office/drawing/2014/main" id="{D7822D4E-F254-1FF6-4CD6-0B65B2D6BFE9}"/>
+                <a16:creationId xmlns:a16="http://schemas.microsoft.com/office/drawing/2014/main" id="{266AF78D-1729-8441-B994-A969D9D4F5EE}"/>
               </a:ext>
             </a:extLst>
           </p:cNvPr>
@@ -8358,19 +8611,18 @@
           <a:lstStyle/>
           <a:p>
             <a:r>
-              <a:rPr lang="ja-JP" altLang="en-US" dirty="0"/>
-              <a:t>英文校正について</a:t>
-            </a:r>
-            <a:endParaRPr lang="en-US" dirty="0"/>
-          </a:p>
-        </p:txBody>
-      </p:sp>
-      <p:sp>
-        <p:nvSpPr>
-          <p:cNvPr id="5" name="テキスト プレースホルダー 4">
+              <a:rPr kumimoji="1" lang="ja-JP" altLang="en-US" dirty="0"/>
+              <a:t>プロンプトのポイント１</a:t>
+            </a:r>
+          </a:p>
+        </p:txBody>
+      </p:sp>
+      <p:sp>
+        <p:nvSpPr>
+          <p:cNvPr id="3" name="テキスト プレースホルダー 2">
             <a:extLst>
               <a:ext uri="{FF2B5EF4-FFF2-40B4-BE49-F238E27FC236}">
-                <a16:creationId xmlns:a16="http://schemas.microsoft.com/office/drawing/2014/main" id="{5591299F-3C44-9260-09AD-482B6F05CF1D}"/>
+                <a16:creationId xmlns:a16="http://schemas.microsoft.com/office/drawing/2014/main" id="{95E7F31A-4AA6-383E-E268-19FC475BB9CA}"/>
               </a:ext>
             </a:extLst>
           </p:cNvPr>
@@ -8387,48 +8639,44 @@
           <a:lstStyle/>
           <a:p>
             <a:r>
-              <a:rPr lang="ja-JP" altLang="en-US" sz="1800" dirty="0"/>
-              <a:t>出来上がった英文は，出来れば英文校正にかけた方が良い</a:t>
-            </a:r>
-            <a:endParaRPr lang="en-US" altLang="ja-JP" sz="1800" dirty="0"/>
+              <a:rPr kumimoji="1" lang="ja-JP" altLang="en-US" dirty="0"/>
+              <a:t>「以降で入力する文章は」</a:t>
+            </a:r>
+            <a:endParaRPr kumimoji="1" lang="en-US" altLang="ja-JP" dirty="0"/>
           </a:p>
           <a:p>
             <a:pPr lvl="1"/>
             <a:r>
-              <a:rPr lang="ja-JP" altLang="en-US" sz="1800" dirty="0"/>
-              <a:t>文法的に正しくても，不自然な言い回しになっている事などがある</a:t>
-            </a:r>
-            <a:endParaRPr lang="en-US" altLang="ja-JP" sz="1800" dirty="0"/>
-          </a:p>
-          <a:p>
-            <a:r>
-              <a:rPr lang="ja-JP" altLang="en-US" sz="1800" dirty="0"/>
-              <a:t>業者には出来るだけ早めに，ゆっくりめのプランで出した方がよい</a:t>
-            </a:r>
-            <a:endParaRPr lang="en-US" altLang="ja-JP" sz="1800" dirty="0"/>
+              <a:rPr kumimoji="1" lang="ja-JP" altLang="en-US" dirty="0"/>
+              <a:t>以降で英文を入れるたびに新しく校正してくれるようになり楽</a:t>
+            </a:r>
+            <a:endParaRPr kumimoji="1" lang="en-US" altLang="ja-JP" dirty="0"/>
+          </a:p>
+          <a:p>
+            <a:r>
+              <a:rPr kumimoji="1" lang="ja-JP" altLang="en-US" dirty="0"/>
+              <a:t>「コンピュータサイエンスにおける論文の一部」</a:t>
+            </a:r>
+            <a:endParaRPr kumimoji="1" lang="en-US" altLang="ja-JP" dirty="0"/>
           </a:p>
           <a:p>
             <a:pPr lvl="1"/>
             <a:r>
-              <a:rPr lang="ja-JP" altLang="en-US" sz="1800" dirty="0"/>
-              <a:t>超特急などでお願いすると校正の質が露骨に落ちることが多い</a:t>
-            </a:r>
-            <a:endParaRPr lang="en-US" altLang="ja-JP" sz="1800" dirty="0"/>
-          </a:p>
-          <a:p>
-            <a:pPr lvl="1"/>
-            <a:r>
-              <a:rPr lang="ja-JP" altLang="en-US" sz="1800" dirty="0"/>
-              <a:t>むこうも人間だし，１日で１０ページやれとかは無理がある</a:t>
-            </a:r>
-            <a:endParaRPr lang="en-US" altLang="ja-JP" sz="1800" dirty="0"/>
+              <a:rPr lang="ja-JP" altLang="en-US" dirty="0"/>
+              <a:t>これ</a:t>
+            </a:r>
+            <a:r>
+              <a:rPr kumimoji="1" lang="ja-JP" altLang="en-US" dirty="0"/>
+              <a:t>がないと語彙がかなりカジュアルになる場合がある</a:t>
+            </a:r>
+            <a:endParaRPr kumimoji="1" lang="en-US" altLang="ja-JP" dirty="0"/>
           </a:p>
         </p:txBody>
       </p:sp>
     </p:spTree>
     <p:extLst>
       <p:ext uri="{BB962C8B-B14F-4D97-AF65-F5344CB8AC3E}">
-        <p14:creationId xmlns:p14="http://schemas.microsoft.com/office/powerpoint/2010/main" val="712631533"/>
+        <p14:creationId xmlns:p14="http://schemas.microsoft.com/office/powerpoint/2010/main" val="1586870506"/>
       </p:ext>
     </p:extLst>
   </p:cSld>
@@ -8468,7 +8716,7 @@
           <p:cNvPr id="2" name="タイトル 1">
             <a:extLst>
               <a:ext uri="{FF2B5EF4-FFF2-40B4-BE49-F238E27FC236}">
-                <a16:creationId xmlns:a16="http://schemas.microsoft.com/office/drawing/2014/main" id="{82909BA6-FCBD-D5DA-5CC2-00348F4CABDA}"/>
+                <a16:creationId xmlns:a16="http://schemas.microsoft.com/office/drawing/2014/main" id="{266AF78D-1729-8441-B994-A969D9D4F5EE}"/>
               </a:ext>
             </a:extLst>
           </p:cNvPr>
@@ -8485,14 +8733,9 @@
           <a:lstStyle/>
           <a:p>
             <a:r>
-              <a:rPr kumimoji="1" lang="en-US" altLang="ja-JP" dirty="0"/>
-              <a:t>Word </a:t>
-            </a:r>
-            <a:r>
-              <a:rPr kumimoji="1" lang="ja-JP" altLang="en-US" dirty="0"/>
-              <a:t>への変換</a:t>
-            </a:r>
-            <a:endParaRPr kumimoji="1" lang="en-US" dirty="0"/>
+              <a:rPr kumimoji="1" lang="ja-JP" altLang="en-US" dirty="0"/>
+              <a:t>プロンプトのポイント２</a:t>
+            </a:r>
           </a:p>
         </p:txBody>
       </p:sp>
@@ -8501,7 +8744,7 @@
           <p:cNvPr id="3" name="テキスト プレースホルダー 2">
             <a:extLst>
               <a:ext uri="{FF2B5EF4-FFF2-40B4-BE49-F238E27FC236}">
-                <a16:creationId xmlns:a16="http://schemas.microsoft.com/office/drawing/2014/main" id="{0863DA87-A39E-1257-1B2D-07D87462A701}"/>
+                <a16:creationId xmlns:a16="http://schemas.microsoft.com/office/drawing/2014/main" id="{95E7F31A-4AA6-383E-E268-19FC475BB9CA}"/>
               </a:ext>
             </a:extLst>
           </p:cNvPr>
@@ -8518,104 +8761,71 @@
           <a:lstStyle/>
           <a:p>
             <a:r>
-              <a:rPr kumimoji="1" lang="ja-JP" altLang="en-US" dirty="0"/>
-              <a:t>校正業者は </a:t>
-            </a:r>
-            <a:r>
-              <a:rPr kumimoji="1" lang="en-US" altLang="ja-JP" dirty="0"/>
-              <a:t>PDF </a:t>
-            </a:r>
-            <a:r>
-              <a:rPr kumimoji="1" lang="ja-JP" altLang="en-US" dirty="0"/>
-              <a:t>を直接校正できない場合が多い</a:t>
-            </a:r>
-            <a:endParaRPr kumimoji="1" lang="en-US" altLang="ja-JP" dirty="0"/>
+              <a:rPr lang="ja-JP" altLang="en-US" dirty="0"/>
+              <a:t>「</a:t>
+            </a:r>
+            <a:r>
+              <a:rPr kumimoji="1" lang="ja-JP" altLang="en-US" dirty="0"/>
+              <a:t>説明の論理や英語について不自然な点がもしあれば</a:t>
+            </a:r>
+            <a:r>
+              <a:rPr lang="ja-JP" altLang="en-US" dirty="0"/>
+              <a:t>」</a:t>
+            </a:r>
+            <a:endParaRPr lang="en-US" altLang="ja-JP" dirty="0"/>
           </a:p>
           <a:p>
             <a:pPr lvl="1"/>
             <a:r>
-              <a:rPr kumimoji="1" lang="ja-JP" altLang="en-US" dirty="0"/>
-              <a:t>可能な場合でも，校正結果が見にくい事が多い</a:t>
-            </a:r>
-            <a:endParaRPr kumimoji="1" lang="en-US" altLang="ja-JP" dirty="0"/>
-          </a:p>
-          <a:p>
-            <a:r>
-              <a:rPr lang="en-US" dirty="0"/>
-              <a:t>PDF </a:t>
-            </a:r>
-            <a:r>
               <a:rPr lang="ja-JP" altLang="en-US" dirty="0"/>
-              <a:t>を </a:t>
-            </a:r>
-            <a:r>
-              <a:rPr lang="en-US" altLang="ja-JP" dirty="0"/>
-              <a:t>Word </a:t>
-            </a:r>
+              <a:t>「説明の論理や」があると，論理の抜けも言ってくれる</a:t>
+            </a:r>
+            <a:endParaRPr lang="en-US" altLang="ja-JP" dirty="0"/>
+          </a:p>
+          <a:p>
+            <a:pPr lvl="1"/>
             <a:r>
               <a:rPr lang="ja-JP" altLang="en-US" dirty="0"/>
-              <a:t>に変換して提出すると良い</a:t>
+              <a:t>「もしあれば」がないと，何がなんでも訂正する傾向がある</a:t>
+            </a:r>
+            <a:endParaRPr kumimoji="1" lang="en-US" altLang="ja-JP" dirty="0"/>
+          </a:p>
+          <a:p>
+            <a:r>
+              <a:rPr lang="ja-JP" altLang="en-US" dirty="0"/>
+              <a:t>「</a:t>
+            </a:r>
+            <a:r>
+              <a:rPr kumimoji="1" lang="ja-JP" altLang="en-US" dirty="0"/>
+              <a:t>その理由を日本語で指摘して，英文を訂正してください</a:t>
+            </a:r>
+            <a:r>
+              <a:rPr lang="ja-JP" altLang="en-US" dirty="0"/>
+              <a:t>」</a:t>
             </a:r>
             <a:endParaRPr lang="en-US" altLang="ja-JP" dirty="0"/>
           </a:p>
           <a:p>
             <a:pPr lvl="1"/>
             <a:r>
-              <a:rPr kumimoji="1" lang="en-US" dirty="0"/>
-              <a:t>Word </a:t>
-            </a:r>
-            <a:r>
-              <a:rPr kumimoji="1" lang="ja-JP" altLang="en-US" dirty="0"/>
-              <a:t>は </a:t>
-            </a:r>
-            <a:r>
-              <a:rPr kumimoji="1" lang="en-US" altLang="ja-JP" dirty="0"/>
-              <a:t>PDF </a:t>
-            </a:r>
-            <a:r>
-              <a:rPr kumimoji="1" lang="ja-JP" altLang="en-US" dirty="0"/>
-              <a:t>を変換して読み込むことができる</a:t>
-            </a:r>
-            <a:endParaRPr kumimoji="1" lang="en-US" altLang="ja-JP" dirty="0"/>
-          </a:p>
-          <a:p>
-            <a:pPr lvl="2"/>
-            <a:r>
-              <a:rPr kumimoji="1" lang="ja-JP" altLang="en-US" dirty="0"/>
-              <a:t>変換精度は結構高い</a:t>
-            </a:r>
-            <a:endParaRPr kumimoji="1" lang="en-US" altLang="ja-JP" dirty="0"/>
-          </a:p>
-          <a:p>
-            <a:pPr lvl="1"/>
-            <a:r>
-              <a:rPr lang="en-US" dirty="0"/>
-              <a:t>Word </a:t>
-            </a:r>
-            <a:r>
               <a:rPr lang="ja-JP" altLang="en-US" dirty="0"/>
-              <a:t>の校閲機能を使って校正をしてもらう</a:t>
+              <a:t>ここを正確に指示しないと，訂正が日本語で出たりする</a:t>
             </a:r>
             <a:endParaRPr lang="en-US" altLang="ja-JP" dirty="0"/>
           </a:p>
           <a:p>
-            <a:pPr lvl="1"/>
-            <a:r>
-              <a:rPr kumimoji="1" lang="en-US" altLang="ja-JP" dirty="0"/>
-              <a:t>Word </a:t>
-            </a:r>
-            <a:r>
-              <a:rPr kumimoji="1" lang="ja-JP" altLang="en-US" dirty="0"/>
-              <a:t>の場合，書き換えにより文書がずれても割と平気</a:t>
-            </a:r>
-            <a:endParaRPr kumimoji="1" lang="en-US" dirty="0"/>
+            <a:r>
+              <a:rPr lang="ja-JP" altLang="en-US" dirty="0"/>
+              <a:t>指示を１文にまとめないと，たまに２文目以降を訂正しようとすることがあるので１文にしてある</a:t>
+            </a:r>
+            <a:endParaRPr lang="en-US" altLang="ja-JP" dirty="0"/>
           </a:p>
         </p:txBody>
       </p:sp>
     </p:spTree>
     <p:extLst>
       <p:ext uri="{BB962C8B-B14F-4D97-AF65-F5344CB8AC3E}">
-        <p14:creationId xmlns:p14="http://schemas.microsoft.com/office/powerpoint/2010/main" val="2879799691"/>
+        <p14:creationId xmlns:p14="http://schemas.microsoft.com/office/powerpoint/2010/main" val="2900022621"/>
       </p:ext>
     </p:extLst>
   </p:cSld>
@@ -8655,7 +8865,7 @@
           <p:cNvPr id="2" name="タイトル 1">
             <a:extLst>
               <a:ext uri="{FF2B5EF4-FFF2-40B4-BE49-F238E27FC236}">
-                <a16:creationId xmlns:a16="http://schemas.microsoft.com/office/drawing/2014/main" id="{0174AC09-5A95-9689-5970-5AB3C0EB9BC4}"/>
+                <a16:creationId xmlns:a16="http://schemas.microsoft.com/office/drawing/2014/main" id="{266AF78D-1729-8441-B994-A969D9D4F5EE}"/>
               </a:ext>
             </a:extLst>
           </p:cNvPr>
@@ -8673,9 +8883,8 @@
           <a:p>
             <a:r>
               <a:rPr kumimoji="1" lang="ja-JP" altLang="en-US" dirty="0"/>
-              <a:t>校正時のフォーマット</a:t>
-            </a:r>
-            <a:endParaRPr kumimoji="1" lang="en-US" dirty="0"/>
+              <a:t>指示をする際のポイント</a:t>
+            </a:r>
           </a:p>
         </p:txBody>
       </p:sp>
@@ -8684,7 +8893,7 @@
           <p:cNvPr id="3" name="テキスト プレースホルダー 2">
             <a:extLst>
               <a:ext uri="{FF2B5EF4-FFF2-40B4-BE49-F238E27FC236}">
-                <a16:creationId xmlns:a16="http://schemas.microsoft.com/office/drawing/2014/main" id="{E838EE79-D79D-FC42-CD74-7B72EF352D31}"/>
+                <a16:creationId xmlns:a16="http://schemas.microsoft.com/office/drawing/2014/main" id="{95E7F31A-4AA6-383E-E268-19FC475BB9CA}"/>
               </a:ext>
             </a:extLst>
           </p:cNvPr>
@@ -8695,559 +8904,744 @@
             <p:ph type="body" sz="quarter" idx="10"/>
           </p:nvPr>
         </p:nvSpPr>
-        <p:spPr>
-          <a:xfrm>
-            <a:off x="611956" y="1088975"/>
-            <a:ext cx="8280092" cy="1800020"/>
-          </a:xfrm>
-        </p:spPr>
+        <p:spPr/>
         <p:txBody>
           <a:bodyPr/>
           <a:lstStyle/>
           <a:p>
             <a:r>
-              <a:rPr kumimoji="1" lang="ja-JP" altLang="en-US" sz="1800" dirty="0"/>
-              <a:t>ドキュメントクラスを差し替えて，シングルカラムに変更した方がよい</a:t>
-            </a:r>
-            <a:endParaRPr kumimoji="1" lang="en-US" altLang="ja-JP" sz="1800" dirty="0"/>
+              <a:rPr kumimoji="1" lang="ja-JP" altLang="en-US" dirty="0"/>
+              <a:t>あまりたくさんの事を同時に指示しない</a:t>
+            </a:r>
+            <a:endParaRPr kumimoji="1" lang="en-US" altLang="ja-JP" dirty="0"/>
           </a:p>
           <a:p>
             <a:pPr lvl="1"/>
             <a:r>
-              <a:rPr lang="en-US" sz="1800" dirty="0"/>
-              <a:t>PDF </a:t>
-            </a:r>
-            <a:r>
-              <a:rPr lang="ja-JP" altLang="en-US" sz="1800" dirty="0"/>
-              <a:t>から </a:t>
-            </a:r>
-            <a:r>
-              <a:rPr lang="en-US" sz="1800" dirty="0"/>
-              <a:t>Word </a:t>
-            </a:r>
-            <a:r>
-              <a:rPr lang="ja-JP" altLang="en-US" sz="1800" dirty="0"/>
-              <a:t>に変換した際にダブルカラムよりも形が崩れにくい</a:t>
-            </a:r>
-            <a:endParaRPr lang="en-US" altLang="ja-JP" sz="1800" dirty="0"/>
+              <a:rPr lang="ja-JP" altLang="en-US" dirty="0"/>
+              <a:t>人間と同じで，同時にたくさん指示しても対応してくれない</a:t>
+            </a:r>
+            <a:endParaRPr lang="en-US" altLang="ja-JP" dirty="0"/>
+          </a:p>
+          <a:p>
+            <a:r>
+              <a:rPr lang="ja-JP" altLang="en-US" dirty="0"/>
+              <a:t>なるべく同一セッション内で，論文に書かれている文章の順序で校正をした方が良い</a:t>
+            </a:r>
+            <a:endParaRPr lang="en-US" altLang="ja-JP" dirty="0"/>
           </a:p>
           <a:p>
             <a:pPr lvl="1"/>
             <a:r>
-              <a:rPr kumimoji="1" lang="ja-JP" altLang="en-US" sz="1800" dirty="0"/>
-              <a:t>校正者による書き換えでも形が崩れにくい</a:t>
-            </a:r>
-            <a:endParaRPr kumimoji="1" lang="en-US" altLang="ja-JP" sz="1800" dirty="0"/>
-          </a:p>
-          <a:p>
-            <a:r>
-              <a:rPr kumimoji="1" lang="ja-JP" altLang="en-US" sz="1800" dirty="0"/>
-              <a:t>以下のようなマクロを使用して切り替えると良い</a:t>
-            </a:r>
-            <a:endParaRPr kumimoji="1" lang="en-US" sz="1800" dirty="0"/>
-          </a:p>
-        </p:txBody>
-      </p:sp>
-      <p:sp>
-        <p:nvSpPr>
-          <p:cNvPr id="4" name="正方形/長方形 3">
+              <a:rPr lang="ja-JP" altLang="en-US" dirty="0"/>
+              <a:t>過去の入力を参照して，その文脈を意識してくれる</a:t>
+            </a:r>
+            <a:endParaRPr lang="en-US" altLang="ja-JP" dirty="0"/>
+          </a:p>
+        </p:txBody>
+      </p:sp>
+    </p:spTree>
+    <p:extLst>
+      <p:ext uri="{BB962C8B-B14F-4D97-AF65-F5344CB8AC3E}">
+        <p14:creationId xmlns:p14="http://schemas.microsoft.com/office/powerpoint/2010/main" val="1692704127"/>
+      </p:ext>
+    </p:extLst>
+  </p:cSld>
+  <p:clrMapOvr>
+    <a:masterClrMapping/>
+  </p:clrMapOvr>
+  <mc:AlternateContent xmlns:mc="http://schemas.openxmlformats.org/markup-compatibility/2006" xmlns:p14="http://schemas.microsoft.com/office/powerpoint/2010/main">
+    <mc:Choice Requires="p14">
+      <p:transition p14:dur="10"/>
+    </mc:Choice>
+    <mc:Fallback xmlns="">
+      <p:transition/>
+    </mc:Fallback>
+  </mc:AlternateContent>
+</p:sld>
+</file>
+
+<file path=ppt/slides/slide43.xml><?xml version="1.0" encoding="utf-8"?>
+<p:sld xmlns:a="http://schemas.openxmlformats.org/drawingml/2006/main" xmlns:r="http://schemas.openxmlformats.org/officeDocument/2006/relationships" xmlns:p="http://schemas.openxmlformats.org/presentationml/2006/main">
+  <p:cSld>
+    <p:spTree>
+      <p:nvGrpSpPr>
+        <p:cNvPr id="1" name=""/>
+        <p:cNvGrpSpPr/>
+        <p:nvPr/>
+      </p:nvGrpSpPr>
+      <p:grpSpPr>
+        <a:xfrm>
+          <a:off x="0" y="0"/>
+          <a:ext cx="0" cy="0"/>
+          <a:chOff x="0" y="0"/>
+          <a:chExt cx="0" cy="0"/>
+        </a:xfrm>
+      </p:grpSpPr>
+      <p:sp>
+        <p:nvSpPr>
+          <p:cNvPr id="2" name="タイトル 1">
             <a:extLst>
               <a:ext uri="{FF2B5EF4-FFF2-40B4-BE49-F238E27FC236}">
-                <a16:creationId xmlns:a16="http://schemas.microsoft.com/office/drawing/2014/main" id="{CCB11F32-7DA9-C070-C055-9E5CD1439469}"/>
+                <a16:creationId xmlns:a16="http://schemas.microsoft.com/office/drawing/2014/main" id="{266AF78D-1729-8441-B994-A969D9D4F5EE}"/>
               </a:ext>
             </a:extLst>
           </p:cNvPr>
-          <p:cNvSpPr/>
-          <p:nvPr/>
-        </p:nvSpPr>
-        <p:spPr bwMode="auto">
-          <a:xfrm>
-            <a:off x="611956" y="3068996"/>
-            <a:ext cx="4230047" cy="3420038"/>
-          </a:xfrm>
-          <a:prstGeom prst="rect">
-            <a:avLst/>
-          </a:prstGeom>
-          <a:noFill/>
-          <a:ln>
-            <a:noFill/>
-            <a:headEnd/>
-            <a:tailEnd type="triangle" w="sm" len="med"/>
-          </a:ln>
-          <a:effectLst/>
-        </p:spPr>
-        <p:style>
-          <a:lnRef idx="1">
-            <a:schemeClr val="accent5"/>
-          </a:lnRef>
-          <a:fillRef idx="2">
-            <a:schemeClr val="accent5"/>
-          </a:fillRef>
-          <a:effectRef idx="1">
-            <a:schemeClr val="accent5"/>
-          </a:effectRef>
-          <a:fontRef idx="minor">
-            <a:schemeClr val="dk1"/>
-          </a:fontRef>
-        </p:style>
-        <p:txBody>
-          <a:bodyPr rot="0" spcFirstLastPara="0" vertOverflow="overflow" horzOverflow="overflow" vert="horz" wrap="none" lIns="91440" tIns="45720" rIns="91440" bIns="45720" numCol="1" spcCol="0" rtlCol="0" fromWordArt="0" anchor="ctr" anchorCtr="0" forceAA="0" compatLnSpc="1">
-            <a:prstTxWarp prst="textNoShape">
-              <a:avLst/>
-            </a:prstTxWarp>
-            <a:noAutofit/>
-          </a:bodyPr>
+          <p:cNvSpPr>
+            <a:spLocks noGrp="1"/>
+          </p:cNvSpPr>
+          <p:nvPr>
+            <p:ph type="title"/>
+          </p:nvPr>
+        </p:nvSpPr>
+        <p:spPr/>
+        <p:txBody>
+          <a:bodyPr/>
           <a:lstStyle/>
           <a:p>
             <a:r>
-              <a:rPr kumimoji="1" lang="en-US" altLang="ja-JP" dirty="0">
-                <a:solidFill>
-                  <a:schemeClr val="accent3"/>
-                </a:solidFill>
-                <a:latin typeface="Consolas" panose="020B0609020204030204" pitchFamily="49" charset="0"/>
-              </a:rPr>
-              <a:t>% </a:t>
-            </a:r>
-            <a:r>
-              <a:rPr kumimoji="1" lang="ja-JP" altLang="en-US" dirty="0">
-                <a:solidFill>
-                  <a:schemeClr val="accent3"/>
-                </a:solidFill>
-                <a:latin typeface="Consolas" panose="020B0609020204030204" pitchFamily="49" charset="0"/>
-              </a:rPr>
-              <a:t>校正業者用にシングルカラム化</a:t>
-            </a:r>
-          </a:p>
-          <a:p>
-            <a:r>
-              <a:rPr kumimoji="1" lang="en-US" altLang="ja-JP" dirty="0">
-                <a:solidFill>
-                  <a:schemeClr val="accent3"/>
-                </a:solidFill>
-                <a:latin typeface="Consolas" panose="020B0609020204030204" pitchFamily="49" charset="0"/>
-              </a:rPr>
-              <a:t>% </a:t>
-            </a:r>
-            <a:r>
-              <a:rPr kumimoji="1" lang="ja-JP" altLang="en-US" dirty="0">
-                <a:solidFill>
-                  <a:schemeClr val="accent3"/>
-                </a:solidFill>
-                <a:latin typeface="Consolas" panose="020B0609020204030204" pitchFamily="49" charset="0"/>
-              </a:rPr>
-              <a:t>投稿時は </a:t>
-            </a:r>
-            <a:r>
-              <a:rPr kumimoji="1" lang="en-US" altLang="ja-JP" dirty="0">
-                <a:solidFill>
-                  <a:schemeClr val="accent3"/>
-                </a:solidFill>
-                <a:latin typeface="Consolas" panose="020B0609020204030204" pitchFamily="49" charset="0"/>
-              </a:rPr>
-              <a:t>\</a:t>
-            </a:r>
-            <a:r>
-              <a:rPr kumimoji="1" lang="en-US" dirty="0" err="1">
-                <a:solidFill>
-                  <a:schemeClr val="accent3"/>
-                </a:solidFill>
-                <a:latin typeface="Consolas" panose="020B0609020204030204" pitchFamily="49" charset="0"/>
-              </a:rPr>
-              <a:t>PROOFtrue</a:t>
-            </a:r>
-            <a:r>
-              <a:rPr kumimoji="1" lang="en-US" dirty="0">
-                <a:solidFill>
-                  <a:schemeClr val="accent3"/>
-                </a:solidFill>
-                <a:latin typeface="Consolas" panose="020B0609020204030204" pitchFamily="49" charset="0"/>
-              </a:rPr>
+              <a:rPr kumimoji="1" lang="ja-JP" altLang="en-US"/>
+              <a:t>指示をする際のポイント</a:t>
+            </a:r>
+            <a:endParaRPr kumimoji="1" lang="ja-JP" altLang="en-US" dirty="0"/>
+          </a:p>
+        </p:txBody>
+      </p:sp>
+      <p:sp>
+        <p:nvSpPr>
+          <p:cNvPr id="3" name="テキスト プレースホルダー 2">
+            <a:extLst>
+              <a:ext uri="{FF2B5EF4-FFF2-40B4-BE49-F238E27FC236}">
+                <a16:creationId xmlns:a16="http://schemas.microsoft.com/office/drawing/2014/main" id="{95E7F31A-4AA6-383E-E268-19FC475BB9CA}"/>
+              </a:ext>
+            </a:extLst>
+          </p:cNvPr>
+          <p:cNvSpPr>
+            <a:spLocks noGrp="1"/>
+          </p:cNvSpPr>
+          <p:nvPr>
+            <p:ph type="body" sz="quarter" idx="10"/>
+          </p:nvPr>
+        </p:nvSpPr>
+        <p:spPr/>
+        <p:txBody>
+          <a:bodyPr/>
+          <a:lstStyle/>
+          <a:p>
+            <a:r>
+              <a:rPr lang="ja-JP" altLang="en-US" dirty="0"/>
+              <a:t>誤った校正が出た場合や使いたい単語と違うものが出てきた場合，個別に訂正すると良い</a:t>
+            </a:r>
+            <a:endParaRPr lang="en-US" altLang="ja-JP" dirty="0"/>
+          </a:p>
+          <a:p>
+            <a:pPr lvl="1"/>
+            <a:r>
+              <a:rPr lang="ja-JP" altLang="en-US" dirty="0"/>
+              <a:t>「</a:t>
+            </a:r>
+            <a:r>
+              <a:rPr lang="en-US" altLang="ja-JP" dirty="0" err="1"/>
+              <a:t>hoge</a:t>
+            </a:r>
+            <a:r>
+              <a:rPr lang="en-US" altLang="ja-JP" dirty="0"/>
               <a:t> </a:t>
             </a:r>
             <a:r>
-              <a:rPr kumimoji="1" lang="ja-JP" altLang="en-US" dirty="0">
-                <a:solidFill>
-                  <a:schemeClr val="accent3"/>
-                </a:solidFill>
-                <a:latin typeface="Consolas" panose="020B0609020204030204" pitchFamily="49" charset="0"/>
-              </a:rPr>
-              <a:t>をコメントアウト</a:t>
-            </a:r>
-          </a:p>
-          <a:p>
-            <a:r>
-              <a:rPr kumimoji="1" lang="en-US" altLang="ja-JP" dirty="0">
+              <a:rPr lang="ja-JP" altLang="en-US" dirty="0"/>
+              <a:t>の部分は </a:t>
+            </a:r>
+            <a:r>
+              <a:rPr lang="en-US" altLang="ja-JP" dirty="0" err="1"/>
+              <a:t>fuga</a:t>
+            </a:r>
+            <a:r>
+              <a:rPr lang="en-US" altLang="ja-JP" dirty="0"/>
+              <a:t> </a:t>
+            </a:r>
+            <a:r>
+              <a:rPr lang="ja-JP" altLang="en-US" dirty="0"/>
+              <a:t>を使ってください」等を言えば対応してくれる</a:t>
+            </a:r>
+            <a:endParaRPr lang="en-US" altLang="ja-JP" dirty="0"/>
+          </a:p>
+          <a:p>
+            <a:pPr lvl="1"/>
+            <a:r>
+              <a:rPr lang="ja-JP" altLang="en-US" dirty="0"/>
+              <a:t>訂正してほしくない部分の指示などもできる</a:t>
+            </a:r>
+            <a:endParaRPr lang="en-US" altLang="ja-JP" dirty="0"/>
+          </a:p>
+          <a:p>
+            <a:r>
+              <a:rPr lang="ja-JP" altLang="en-US" dirty="0"/>
+              <a:t>あまり直してほしくない場合は「明らかにおかしいところ以外はあまり変更しないようにお願いします」と追加で入れる</a:t>
+            </a:r>
+            <a:endParaRPr lang="en-US" altLang="ja-JP" dirty="0"/>
+          </a:p>
+        </p:txBody>
+      </p:sp>
+    </p:spTree>
+    <p:extLst>
+      <p:ext uri="{BB962C8B-B14F-4D97-AF65-F5344CB8AC3E}">
+        <p14:creationId xmlns:p14="http://schemas.microsoft.com/office/powerpoint/2010/main" val="1215278006"/>
+      </p:ext>
+    </p:extLst>
+  </p:cSld>
+  <p:clrMapOvr>
+    <a:masterClrMapping/>
+  </p:clrMapOvr>
+  <mc:AlternateContent xmlns:mc="http://schemas.openxmlformats.org/markup-compatibility/2006" xmlns:p14="http://schemas.microsoft.com/office/powerpoint/2010/main">
+    <mc:Choice Requires="p14">
+      <p:transition p14:dur="10"/>
+    </mc:Choice>
+    <mc:Fallback xmlns="">
+      <p:transition/>
+    </mc:Fallback>
+  </mc:AlternateContent>
+</p:sld>
+</file>
+
+<file path=ppt/slides/slide44.xml><?xml version="1.0" encoding="utf-8"?>
+<p:sld xmlns:a="http://schemas.openxmlformats.org/drawingml/2006/main" xmlns:r="http://schemas.openxmlformats.org/officeDocument/2006/relationships" xmlns:p="http://schemas.openxmlformats.org/presentationml/2006/main">
+  <p:cSld>
+    <p:spTree>
+      <p:nvGrpSpPr>
+        <p:cNvPr id="1" name=""/>
+        <p:cNvGrpSpPr/>
+        <p:nvPr/>
+      </p:nvGrpSpPr>
+      <p:grpSpPr>
+        <a:xfrm>
+          <a:off x="0" y="0"/>
+          <a:ext cx="0" cy="0"/>
+          <a:chOff x="0" y="0"/>
+          <a:chExt cx="0" cy="0"/>
+        </a:xfrm>
+      </p:grpSpPr>
+      <p:sp>
+        <p:nvSpPr>
+          <p:cNvPr id="2" name="タイトル 1">
+            <a:extLst>
+              <a:ext uri="{FF2B5EF4-FFF2-40B4-BE49-F238E27FC236}">
+                <a16:creationId xmlns:a16="http://schemas.microsoft.com/office/drawing/2014/main" id="{14ADFFFD-15EB-369F-6134-1F97B59CDD43}"/>
+              </a:ext>
+            </a:extLst>
+          </p:cNvPr>
+          <p:cNvSpPr>
+            <a:spLocks noGrp="1"/>
+          </p:cNvSpPr>
+          <p:nvPr>
+            <p:ph type="title"/>
+          </p:nvPr>
+        </p:nvSpPr>
+        <p:spPr/>
+        <p:txBody>
+          <a:bodyPr/>
+          <a:lstStyle/>
+          <a:p>
+            <a:r>
+              <a:rPr kumimoji="1" lang="ja-JP" altLang="en-US" dirty="0"/>
+              <a:t>校正の確認</a:t>
+            </a:r>
+          </a:p>
+        </p:txBody>
+      </p:sp>
+      <p:sp>
+        <p:nvSpPr>
+          <p:cNvPr id="3" name="テキスト プレースホルダー 2">
+            <a:extLst>
+              <a:ext uri="{FF2B5EF4-FFF2-40B4-BE49-F238E27FC236}">
+                <a16:creationId xmlns:a16="http://schemas.microsoft.com/office/drawing/2014/main" id="{79986DF0-F3FB-9038-79CB-5DD1B774B457}"/>
+              </a:ext>
+            </a:extLst>
+          </p:cNvPr>
+          <p:cNvSpPr>
+            <a:spLocks noGrp="1"/>
+          </p:cNvSpPr>
+          <p:nvPr>
+            <p:ph type="body" sz="quarter" idx="10"/>
+          </p:nvPr>
+        </p:nvSpPr>
+        <p:spPr/>
+        <p:txBody>
+          <a:bodyPr/>
+          <a:lstStyle/>
+          <a:p>
+            <a:r>
+              <a:rPr kumimoji="1" lang="ja-JP" altLang="en-US" b="1" dirty="0">
                 <a:solidFill>
                   <a:schemeClr val="accent5"/>
                 </a:solidFill>
-                <a:latin typeface="Consolas" panose="020B0609020204030204" pitchFamily="49" charset="0"/>
               </a:rPr>
-              <a:t>\</a:t>
-            </a:r>
-            <a:r>
-              <a:rPr kumimoji="1" lang="en-US" dirty="0" err="1">
+              <a:t>必ず校正結果は自分で確認する</a:t>
+            </a:r>
+            <a:endParaRPr kumimoji="1" lang="en-US" altLang="ja-JP" b="1" dirty="0">
+              <a:solidFill>
+                <a:schemeClr val="accent5"/>
+              </a:solidFill>
+            </a:endParaRPr>
+          </a:p>
+          <a:p>
+            <a:pPr lvl="1"/>
+            <a:r>
+              <a:rPr kumimoji="1" lang="ja-JP" altLang="en-US" dirty="0"/>
+              <a:t>意図しない文が追加 </a:t>
+            </a:r>
+            <a:r>
+              <a:rPr kumimoji="1" lang="en-US" altLang="ja-JP" dirty="0"/>
+              <a:t>or </a:t>
+            </a:r>
+            <a:r>
+              <a:rPr kumimoji="1" lang="ja-JP" altLang="en-US" dirty="0"/>
+              <a:t>削除されていることがよくある</a:t>
+            </a:r>
+            <a:endParaRPr kumimoji="1" lang="en-US" altLang="ja-JP" dirty="0"/>
+          </a:p>
+          <a:p>
+            <a:pPr lvl="1"/>
+            <a:r>
+              <a:rPr lang="ja-JP" altLang="en-US" dirty="0"/>
+              <a:t>文意が意訳されて変わってしまってる事もある</a:t>
+            </a:r>
+            <a:endParaRPr kumimoji="1" lang="en-US" altLang="ja-JP" dirty="0"/>
+          </a:p>
+          <a:p>
+            <a:pPr lvl="1"/>
+            <a:r>
+              <a:rPr lang="ja-JP" altLang="en-US" dirty="0"/>
+              <a:t>冠詞など，全体の文脈がわからないと正確な判断ができない部分もある</a:t>
+            </a:r>
+            <a:endParaRPr lang="en-US" altLang="ja-JP" dirty="0"/>
+          </a:p>
+          <a:p>
+            <a:r>
+              <a:rPr kumimoji="1" lang="ja-JP" altLang="en-US" dirty="0"/>
+              <a:t>まじめに確認をしながら進めると，１ページあたり１時間</a:t>
+            </a:r>
+            <a:r>
+              <a:rPr lang="ja-JP" altLang="en-US" dirty="0"/>
+              <a:t>半ぐらいは校正にかかる</a:t>
+            </a:r>
+            <a:endParaRPr lang="en-US" altLang="ja-JP" dirty="0"/>
+          </a:p>
+          <a:p>
+            <a:pPr lvl="1"/>
+            <a:r>
+              <a:rPr kumimoji="1" lang="ja-JP" altLang="en-US" dirty="0"/>
+              <a:t>日本語</a:t>
+            </a:r>
+            <a:r>
+              <a:rPr lang="ja-JP" altLang="en-US" dirty="0"/>
+              <a:t>まで手戻りすることも多い</a:t>
+            </a:r>
+            <a:endParaRPr kumimoji="1" lang="ja-JP" altLang="en-US" dirty="0"/>
+          </a:p>
+        </p:txBody>
+      </p:sp>
+    </p:spTree>
+    <p:extLst>
+      <p:ext uri="{BB962C8B-B14F-4D97-AF65-F5344CB8AC3E}">
+        <p14:creationId xmlns:p14="http://schemas.microsoft.com/office/powerpoint/2010/main" val="2829759246"/>
+      </p:ext>
+    </p:extLst>
+  </p:cSld>
+  <p:clrMapOvr>
+    <a:masterClrMapping/>
+  </p:clrMapOvr>
+  <mc:AlternateContent xmlns:mc="http://schemas.openxmlformats.org/markup-compatibility/2006" xmlns:p14="http://schemas.microsoft.com/office/powerpoint/2010/main">
+    <mc:Choice Requires="p14">
+      <p:transition p14:dur="10"/>
+    </mc:Choice>
+    <mc:Fallback xmlns="">
+      <p:transition/>
+    </mc:Fallback>
+  </mc:AlternateContent>
+</p:sld>
+</file>
+
+<file path=ppt/slides/slide45.xml><?xml version="1.0" encoding="utf-8"?>
+<p:sld xmlns:a="http://schemas.openxmlformats.org/drawingml/2006/main" xmlns:r="http://schemas.openxmlformats.org/officeDocument/2006/relationships" xmlns:p="http://schemas.openxmlformats.org/presentationml/2006/main">
+  <p:cSld>
+    <p:spTree>
+      <p:nvGrpSpPr>
+        <p:cNvPr id="1" name=""/>
+        <p:cNvGrpSpPr/>
+        <p:nvPr/>
+      </p:nvGrpSpPr>
+      <p:grpSpPr>
+        <a:xfrm>
+          <a:off x="0" y="0"/>
+          <a:ext cx="0" cy="0"/>
+          <a:chOff x="0" y="0"/>
+          <a:chExt cx="0" cy="0"/>
+        </a:xfrm>
+      </p:grpSpPr>
+      <p:sp>
+        <p:nvSpPr>
+          <p:cNvPr id="4" name="タイトル 3">
+            <a:extLst>
+              <a:ext uri="{FF2B5EF4-FFF2-40B4-BE49-F238E27FC236}">
+                <a16:creationId xmlns:a16="http://schemas.microsoft.com/office/drawing/2014/main" id="{6F8815B0-4243-7B07-F4BD-1C0A780A3E0B}"/>
+              </a:ext>
+            </a:extLst>
+          </p:cNvPr>
+          <p:cNvSpPr>
+            <a:spLocks noGrp="1"/>
+          </p:cNvSpPr>
+          <p:nvPr>
+            <p:ph type="title"/>
+          </p:nvPr>
+        </p:nvSpPr>
+        <p:spPr/>
+        <p:txBody>
+          <a:bodyPr/>
+          <a:lstStyle/>
+          <a:p>
+            <a:r>
+              <a:rPr lang="ja-JP" altLang="en-US" dirty="0"/>
+              <a:t>文法チェッカーによる確認</a:t>
+            </a:r>
+          </a:p>
+        </p:txBody>
+      </p:sp>
+    </p:spTree>
+    <p:extLst>
+      <p:ext uri="{BB962C8B-B14F-4D97-AF65-F5344CB8AC3E}">
+        <p14:creationId xmlns:p14="http://schemas.microsoft.com/office/powerpoint/2010/main" val="4024130881"/>
+      </p:ext>
+    </p:extLst>
+  </p:cSld>
+  <p:clrMapOvr>
+    <a:masterClrMapping/>
+  </p:clrMapOvr>
+</p:sld>
+</file>
+
+<file path=ppt/slides/slide46.xml><?xml version="1.0" encoding="utf-8"?>
+<p:sld xmlns:a="http://schemas.openxmlformats.org/drawingml/2006/main" xmlns:r="http://schemas.openxmlformats.org/officeDocument/2006/relationships" xmlns:p="http://schemas.openxmlformats.org/presentationml/2006/main">
+  <p:cSld>
+    <p:spTree>
+      <p:nvGrpSpPr>
+        <p:cNvPr id="1" name=""/>
+        <p:cNvGrpSpPr/>
+        <p:nvPr/>
+      </p:nvGrpSpPr>
+      <p:grpSpPr>
+        <a:xfrm>
+          <a:off x="0" y="0"/>
+          <a:ext cx="0" cy="0"/>
+          <a:chOff x="0" y="0"/>
+          <a:chExt cx="0" cy="0"/>
+        </a:xfrm>
+      </p:grpSpPr>
+      <p:sp>
+        <p:nvSpPr>
+          <p:cNvPr id="4" name="タイトル 3">
+            <a:extLst>
+              <a:ext uri="{FF2B5EF4-FFF2-40B4-BE49-F238E27FC236}">
+                <a16:creationId xmlns:a16="http://schemas.microsoft.com/office/drawing/2014/main" id="{6C423390-69C4-FBFF-2641-53532CF918C8}"/>
+              </a:ext>
+            </a:extLst>
+          </p:cNvPr>
+          <p:cNvSpPr>
+            <a:spLocks noGrp="1"/>
+          </p:cNvSpPr>
+          <p:nvPr>
+            <p:ph type="title"/>
+          </p:nvPr>
+        </p:nvSpPr>
+        <p:spPr/>
+        <p:txBody>
+          <a:bodyPr/>
+          <a:lstStyle/>
+          <a:p>
+            <a:r>
+              <a:rPr lang="ja-JP" altLang="en-US" dirty="0"/>
+              <a:t>文法チェッカーによる確認</a:t>
+            </a:r>
+          </a:p>
+        </p:txBody>
+      </p:sp>
+      <p:sp>
+        <p:nvSpPr>
+          <p:cNvPr id="5" name="テキスト プレースホルダー 4">
+            <a:extLst>
+              <a:ext uri="{FF2B5EF4-FFF2-40B4-BE49-F238E27FC236}">
+                <a16:creationId xmlns:a16="http://schemas.microsoft.com/office/drawing/2014/main" id="{0A07C90D-5F55-4BA0-E29C-6AC2654528F3}"/>
+              </a:ext>
+            </a:extLst>
+          </p:cNvPr>
+          <p:cNvSpPr>
+            <a:spLocks noGrp="1"/>
+          </p:cNvSpPr>
+          <p:nvPr>
+            <p:ph type="body" sz="quarter" idx="10"/>
+          </p:nvPr>
+        </p:nvSpPr>
+        <p:spPr/>
+        <p:txBody>
+          <a:bodyPr/>
+          <a:lstStyle/>
+          <a:p>
+            <a:r>
+              <a:rPr lang="ja-JP" altLang="en-US" sz="1800" dirty="0"/>
+              <a:t>出来上がった文章は最後に文法チェッカーで確認する</a:t>
+            </a:r>
+            <a:endParaRPr lang="en-US" altLang="ja-JP" sz="1800" dirty="0"/>
+          </a:p>
+          <a:p>
+            <a:pPr lvl="1"/>
+            <a:r>
+              <a:rPr lang="ja-JP" altLang="en-US" sz="1800" dirty="0"/>
+              <a:t>手直しの際に文法の誤りが入ることは多いため，確認は必須</a:t>
+            </a:r>
+            <a:endParaRPr lang="en-US" altLang="ja-JP" sz="1800" dirty="0"/>
+          </a:p>
+          <a:p>
+            <a:r>
+              <a:rPr lang="ja-JP" altLang="en-US" sz="1800" dirty="0"/>
+              <a:t>下記のツールを使うと良い</a:t>
+            </a:r>
+            <a:endParaRPr lang="en-US" altLang="ja-JP" sz="1800" dirty="0"/>
+          </a:p>
+          <a:p>
+            <a:pPr lvl="1"/>
+            <a:r>
+              <a:rPr lang="en-US" altLang="ja-JP" sz="1800" dirty="0" err="1"/>
+              <a:t>Grammaly</a:t>
+            </a:r>
+            <a:endParaRPr lang="en-US" altLang="ja-JP" sz="1800" dirty="0"/>
+          </a:p>
+          <a:p>
+            <a:pPr lvl="1"/>
+            <a:r>
+              <a:rPr lang="en-US" altLang="ja-JP" sz="1800" dirty="0" err="1"/>
+              <a:t>Writeful</a:t>
+            </a:r>
+            <a:endParaRPr lang="en-US" altLang="ja-JP" sz="1800" dirty="0"/>
+          </a:p>
+          <a:p>
+            <a:pPr marL="360000" lvl="1" indent="0">
+              <a:buNone/>
+            </a:pPr>
+            <a:r>
+              <a:rPr lang="ja-JP" altLang="en-US" sz="1800" dirty="0"/>
+              <a:t>（</a:t>
+            </a:r>
+            <a:r>
+              <a:rPr lang="en-US" altLang="ja-JP" sz="1800" dirty="0"/>
+              <a:t>Overleaf </a:t>
+            </a:r>
+            <a:r>
+              <a:rPr lang="ja-JP" altLang="en-US" sz="1800" dirty="0"/>
+              <a:t>を使っているなら，どちらのツールも自動で対応している</a:t>
+            </a:r>
+            <a:endParaRPr lang="en-US" altLang="ja-JP" sz="1800" dirty="0"/>
+          </a:p>
+          <a:p>
+            <a:r>
+              <a:rPr lang="ja-JP" altLang="en-US" sz="1800" dirty="0"/>
+              <a:t>ただし，指摘してくる事項は機械的に適用してはいけない</a:t>
+            </a:r>
+            <a:endParaRPr lang="en-US" altLang="ja-JP" sz="1800" dirty="0"/>
+          </a:p>
+          <a:p>
+            <a:pPr lvl="1"/>
+            <a:r>
+              <a:rPr lang="ja-JP" altLang="en-US" sz="1800" dirty="0"/>
+              <a:t>特に冠詞など，文脈から判断されるものは指摘が間違っている事も多い</a:t>
+            </a:r>
+          </a:p>
+        </p:txBody>
+      </p:sp>
+      <p:sp>
+        <p:nvSpPr>
+          <p:cNvPr id="2" name="スライド番号プレースホルダー 1">
+            <a:extLst>
+              <a:ext uri="{FF2B5EF4-FFF2-40B4-BE49-F238E27FC236}">
+                <a16:creationId xmlns:a16="http://schemas.microsoft.com/office/drawing/2014/main" id="{88AF93A0-907F-352A-97CC-3E4F9E14ABEE}"/>
+              </a:ext>
+            </a:extLst>
+          </p:cNvPr>
+          <p:cNvSpPr>
+            <a:spLocks noGrp="1"/>
+          </p:cNvSpPr>
+          <p:nvPr>
+            <p:ph type="sldNum" sz="quarter" idx="4294967295"/>
+          </p:nvPr>
+        </p:nvSpPr>
+        <p:spPr>
+          <a:xfrm>
+            <a:off x="8531225" y="6308725"/>
+            <a:ext cx="612775" cy="549275"/>
+          </a:xfrm>
+        </p:spPr>
+        <p:txBody>
+          <a:bodyPr/>
+          <a:lstStyle/>
+          <a:p>
+            <a:fld id="{D2D8002D-B5B0-4BAC-B1F6-782DDCCE6D9C}" type="slidenum">
+              <a:rPr kumimoji="1" lang="ja-JP" altLang="en-US" smtClean="0"/>
+              <a:pPr/>
+              <a:t>46</a:t>
+            </a:fld>
+            <a:endParaRPr kumimoji="1" lang="ja-JP" altLang="en-US"/>
+          </a:p>
+        </p:txBody>
+      </p:sp>
+    </p:spTree>
+    <p:extLst>
+      <p:ext uri="{BB962C8B-B14F-4D97-AF65-F5344CB8AC3E}">
+        <p14:creationId xmlns:p14="http://schemas.microsoft.com/office/powerpoint/2010/main" val="869398461"/>
+      </p:ext>
+    </p:extLst>
+  </p:cSld>
+  <p:clrMapOvr>
+    <a:masterClrMapping/>
+  </p:clrMapOvr>
+  <mc:AlternateContent xmlns:mc="http://schemas.openxmlformats.org/markup-compatibility/2006" xmlns:p14="http://schemas.microsoft.com/office/powerpoint/2010/main">
+    <mc:Choice Requires="p14">
+      <p:transition p14:dur="10"/>
+    </mc:Choice>
+    <mc:Fallback xmlns="">
+      <p:transition/>
+    </mc:Fallback>
+  </mc:AlternateContent>
+</p:sld>
+</file>
+
+<file path=ppt/slides/slide47.xml><?xml version="1.0" encoding="utf-8"?>
+<p:sld xmlns:a="http://schemas.openxmlformats.org/drawingml/2006/main" xmlns:r="http://schemas.openxmlformats.org/officeDocument/2006/relationships" xmlns:p="http://schemas.openxmlformats.org/presentationml/2006/main">
+  <p:cSld>
+    <p:spTree>
+      <p:nvGrpSpPr>
+        <p:cNvPr id="1" name=""/>
+        <p:cNvGrpSpPr/>
+        <p:nvPr/>
+      </p:nvGrpSpPr>
+      <p:grpSpPr>
+        <a:xfrm>
+          <a:off x="0" y="0"/>
+          <a:ext cx="0" cy="0"/>
+          <a:chOff x="0" y="0"/>
+          <a:chExt cx="0" cy="0"/>
+        </a:xfrm>
+      </p:grpSpPr>
+      <p:sp>
+        <p:nvSpPr>
+          <p:cNvPr id="2" name="タイトル 1">
+            <a:extLst>
+              <a:ext uri="{FF2B5EF4-FFF2-40B4-BE49-F238E27FC236}">
+                <a16:creationId xmlns:a16="http://schemas.microsoft.com/office/drawing/2014/main" id="{1A38D290-8A50-0AEC-BF9B-7F0BD18F3EA7}"/>
+              </a:ext>
+            </a:extLst>
+          </p:cNvPr>
+          <p:cNvSpPr>
+            <a:spLocks noGrp="1"/>
+          </p:cNvSpPr>
+          <p:nvPr>
+            <p:ph type="title"/>
+          </p:nvPr>
+        </p:nvSpPr>
+        <p:spPr/>
+        <p:txBody>
+          <a:bodyPr/>
+          <a:lstStyle/>
+          <a:p>
+            <a:r>
+              <a:rPr kumimoji="1" lang="ja-JP" altLang="en-US" dirty="0"/>
+              <a:t>スペルチェックについて</a:t>
+            </a:r>
+          </a:p>
+        </p:txBody>
+      </p:sp>
+      <p:sp>
+        <p:nvSpPr>
+          <p:cNvPr id="3" name="テキスト プレースホルダー 2">
+            <a:extLst>
+              <a:ext uri="{FF2B5EF4-FFF2-40B4-BE49-F238E27FC236}">
+                <a16:creationId xmlns:a16="http://schemas.microsoft.com/office/drawing/2014/main" id="{247B98D5-4504-8842-18A1-062F8DEC3DA1}"/>
+              </a:ext>
+            </a:extLst>
+          </p:cNvPr>
+          <p:cNvSpPr>
+            <a:spLocks noGrp="1"/>
+          </p:cNvSpPr>
+          <p:nvPr>
+            <p:ph type="body" sz="quarter" idx="10"/>
+          </p:nvPr>
+        </p:nvSpPr>
+        <p:spPr/>
+        <p:txBody>
+          <a:bodyPr/>
+          <a:lstStyle/>
+          <a:p>
+            <a:r>
+              <a:rPr kumimoji="1" lang="ja-JP" altLang="en-US" dirty="0"/>
+              <a:t>スペルチェック付きのエディタを使うこと</a:t>
+            </a:r>
+            <a:endParaRPr kumimoji="1" lang="en-US" altLang="ja-JP" dirty="0"/>
+          </a:p>
+          <a:p>
+            <a:pPr lvl="1"/>
+            <a:r>
+              <a:rPr lang="en-US" altLang="ja-JP" dirty="0" err="1"/>
+              <a:t>vscode</a:t>
+            </a:r>
+            <a:r>
+              <a:rPr lang="en-US" altLang="ja-JP" dirty="0"/>
+              <a:t> </a:t>
+            </a:r>
+            <a:r>
+              <a:rPr lang="ja-JP" altLang="en-US" dirty="0"/>
+              <a:t>ならアドオンを入れる</a:t>
+            </a:r>
+            <a:endParaRPr lang="en-US" altLang="ja-JP" dirty="0"/>
+          </a:p>
+          <a:p>
+            <a:pPr lvl="1"/>
+            <a:r>
+              <a:rPr kumimoji="1" lang="en-US" altLang="ja-JP" dirty="0"/>
+              <a:t>overleaf </a:t>
+            </a:r>
+            <a:r>
+              <a:rPr kumimoji="1" lang="ja-JP" altLang="en-US" dirty="0"/>
+              <a:t>なら最初からついている</a:t>
+            </a:r>
+            <a:endParaRPr kumimoji="1" lang="en-US" altLang="ja-JP" dirty="0"/>
+          </a:p>
+          <a:p>
+            <a:r>
+              <a:rPr kumimoji="1" lang="ja-JP" altLang="en-US" dirty="0">
                 <a:solidFill>
                   <a:schemeClr val="accent5"/>
                 </a:solidFill>
-                <a:latin typeface="Consolas" panose="020B0609020204030204" pitchFamily="49" charset="0"/>
               </a:rPr>
-              <a:t>newif</a:t>
-            </a:r>
-            <a:r>
-              <a:rPr kumimoji="1" lang="en-US" dirty="0">
-                <a:solidFill>
-                  <a:schemeClr val="accent5"/>
-                </a:solidFill>
-                <a:latin typeface="Consolas" panose="020B0609020204030204" pitchFamily="49" charset="0"/>
-              </a:rPr>
-              <a:t>\</a:t>
-            </a:r>
-            <a:r>
-              <a:rPr kumimoji="1" lang="en-US" dirty="0" err="1">
-                <a:solidFill>
-                  <a:schemeClr val="accent5"/>
-                </a:solidFill>
-                <a:latin typeface="Consolas" panose="020B0609020204030204" pitchFamily="49" charset="0"/>
-              </a:rPr>
-              <a:t>ifPROOF</a:t>
-            </a:r>
-            <a:endParaRPr kumimoji="1" lang="en-US" dirty="0">
+              <a:t>赤線が引かれたら無視しない</a:t>
+            </a:r>
+            <a:endParaRPr kumimoji="1" lang="en-US" altLang="ja-JP" dirty="0">
               <a:solidFill>
                 <a:schemeClr val="accent5"/>
               </a:solidFill>
-              <a:latin typeface="Consolas" panose="020B0609020204030204" pitchFamily="49" charset="0"/>
             </a:endParaRPr>
           </a:p>
           <a:p>
-            <a:r>
-              <a:rPr kumimoji="1" lang="en-US" dirty="0">
-                <a:solidFill>
-                  <a:schemeClr val="accent3"/>
-                </a:solidFill>
-                <a:latin typeface="Consolas" panose="020B0609020204030204" pitchFamily="49" charset="0"/>
-              </a:rPr>
-              <a:t>% \</a:t>
-            </a:r>
-            <a:r>
-              <a:rPr kumimoji="1" lang="en-US" dirty="0" err="1">
-                <a:solidFill>
-                  <a:schemeClr val="accent3"/>
-                </a:solidFill>
-                <a:latin typeface="Consolas" panose="020B0609020204030204" pitchFamily="49" charset="0"/>
-              </a:rPr>
-              <a:t>PROOFtrue</a:t>
-            </a:r>
-            <a:endParaRPr kumimoji="1" lang="en-US" dirty="0">
-              <a:solidFill>
-                <a:schemeClr val="accent3"/>
-              </a:solidFill>
-              <a:latin typeface="Consolas" panose="020B0609020204030204" pitchFamily="49" charset="0"/>
-            </a:endParaRPr>
-          </a:p>
-          <a:p>
-            <a:endParaRPr kumimoji="1" lang="en-US" dirty="0">
-              <a:solidFill>
-                <a:schemeClr val="tx1">
-                  <a:lumMod val="75000"/>
-                  <a:lumOff val="25000"/>
-                </a:schemeClr>
-              </a:solidFill>
-              <a:latin typeface="Consolas" panose="020B0609020204030204" pitchFamily="49" charset="0"/>
-            </a:endParaRPr>
-          </a:p>
-          <a:p>
-            <a:r>
-              <a:rPr kumimoji="1" lang="en-US" dirty="0">
-                <a:solidFill>
-                  <a:schemeClr val="accent5"/>
-                </a:solidFill>
-                <a:latin typeface="Consolas" panose="020B0609020204030204" pitchFamily="49" charset="0"/>
-              </a:rPr>
-              <a:t>\</a:t>
-            </a:r>
-            <a:r>
-              <a:rPr kumimoji="1" lang="en-US" dirty="0" err="1">
-                <a:solidFill>
-                  <a:schemeClr val="accent5"/>
-                </a:solidFill>
-                <a:latin typeface="Consolas" panose="020B0609020204030204" pitchFamily="49" charset="0"/>
-              </a:rPr>
-              <a:t>ifPROOF</a:t>
-            </a:r>
-            <a:endParaRPr kumimoji="1" lang="en-US" dirty="0">
-              <a:solidFill>
-                <a:schemeClr val="accent5"/>
-              </a:solidFill>
-              <a:latin typeface="Consolas" panose="020B0609020204030204" pitchFamily="49" charset="0"/>
-            </a:endParaRPr>
-          </a:p>
-          <a:p>
-            <a:r>
-              <a:rPr kumimoji="1" lang="en-US" dirty="0">
-                <a:solidFill>
-                  <a:schemeClr val="accent3"/>
-                </a:solidFill>
-                <a:latin typeface="Consolas" panose="020B0609020204030204" pitchFamily="49" charset="0"/>
-              </a:rPr>
-              <a:t>    % </a:t>
-            </a:r>
-            <a:r>
-              <a:rPr kumimoji="1" lang="ja-JP" altLang="en-US" dirty="0">
-                <a:solidFill>
-                  <a:schemeClr val="accent3"/>
-                </a:solidFill>
-                <a:latin typeface="Consolas" panose="020B0609020204030204" pitchFamily="49" charset="0"/>
-              </a:rPr>
-              <a:t>校正用シングルカラム化</a:t>
-            </a:r>
-          </a:p>
-          <a:p>
-            <a:r>
-              <a:rPr kumimoji="1" lang="ja-JP" altLang="en-US" dirty="0">
-                <a:solidFill>
-                  <a:schemeClr val="tx1">
-                    <a:lumMod val="75000"/>
-                    <a:lumOff val="25000"/>
-                  </a:schemeClr>
-                </a:solidFill>
-                <a:latin typeface="Consolas" panose="020B0609020204030204" pitchFamily="49" charset="0"/>
-              </a:rPr>
-              <a:t>    </a:t>
-            </a:r>
-            <a:r>
-              <a:rPr kumimoji="1" lang="en-US" altLang="ja-JP" dirty="0">
-                <a:solidFill>
-                  <a:schemeClr val="accent5"/>
-                </a:solidFill>
-                <a:latin typeface="Consolas" panose="020B0609020204030204" pitchFamily="49" charset="0"/>
-              </a:rPr>
-              <a:t>\</a:t>
-            </a:r>
-            <a:r>
-              <a:rPr kumimoji="1" lang="en-US" dirty="0" err="1">
-                <a:solidFill>
-                  <a:schemeClr val="accent5"/>
-                </a:solidFill>
-                <a:latin typeface="Consolas" panose="020B0609020204030204" pitchFamily="49" charset="0"/>
-              </a:rPr>
-              <a:t>documentclass</a:t>
-            </a:r>
-            <a:r>
-              <a:rPr kumimoji="1" lang="en-US" dirty="0">
-                <a:solidFill>
-                  <a:schemeClr val="tx1">
-                    <a:lumMod val="75000"/>
-                    <a:lumOff val="25000"/>
-                  </a:schemeClr>
-                </a:solidFill>
-                <a:latin typeface="Consolas" panose="020B0609020204030204" pitchFamily="49" charset="0"/>
-              </a:rPr>
-              <a:t>[dvipdfmx,conference,</a:t>
-            </a:r>
-            <a:r>
-              <a:rPr kumimoji="1" lang="en-US" dirty="0">
-                <a:solidFill>
-                  <a:schemeClr val="accent5"/>
-                </a:solidFill>
-                <a:latin typeface="Consolas" panose="020B0609020204030204" pitchFamily="49" charset="0"/>
-              </a:rPr>
-              <a:t>onecolumn</a:t>
-            </a:r>
-            <a:r>
-              <a:rPr kumimoji="1" lang="en-US" dirty="0">
-                <a:solidFill>
-                  <a:schemeClr val="tx1">
-                    <a:lumMod val="75000"/>
-                    <a:lumOff val="25000"/>
-                  </a:schemeClr>
-                </a:solidFill>
-                <a:latin typeface="Consolas" panose="020B0609020204030204" pitchFamily="49" charset="0"/>
-              </a:rPr>
-              <a:t>,12pt]{</a:t>
-            </a:r>
-            <a:r>
-              <a:rPr kumimoji="1" lang="en-US" dirty="0" err="1">
-                <a:solidFill>
-                  <a:schemeClr val="tx1">
-                    <a:lumMod val="75000"/>
-                    <a:lumOff val="25000"/>
-                  </a:schemeClr>
-                </a:solidFill>
-                <a:latin typeface="Consolas" panose="020B0609020204030204" pitchFamily="49" charset="0"/>
-              </a:rPr>
-              <a:t>IEEEtran</a:t>
-            </a:r>
-            <a:r>
-              <a:rPr kumimoji="1" lang="en-US" dirty="0">
-                <a:solidFill>
-                  <a:schemeClr val="tx1">
-                    <a:lumMod val="75000"/>
-                    <a:lumOff val="25000"/>
-                  </a:schemeClr>
-                </a:solidFill>
-                <a:latin typeface="Consolas" panose="020B0609020204030204" pitchFamily="49" charset="0"/>
-              </a:rPr>
-              <a:t>}</a:t>
-            </a:r>
-          </a:p>
-          <a:p>
-            <a:r>
-              <a:rPr kumimoji="1" lang="en-US" dirty="0">
-                <a:solidFill>
-                  <a:schemeClr val="accent5"/>
-                </a:solidFill>
-                <a:latin typeface="Consolas" panose="020B0609020204030204" pitchFamily="49" charset="0"/>
-              </a:rPr>
-              <a:t>\else</a:t>
-            </a:r>
-          </a:p>
-          <a:p>
-            <a:r>
-              <a:rPr lang="en-US" dirty="0">
-                <a:solidFill>
-                  <a:schemeClr val="tx1">
-                    <a:lumMod val="75000"/>
-                    <a:lumOff val="25000"/>
-                  </a:schemeClr>
-                </a:solidFill>
-                <a:latin typeface="Consolas" panose="020B0609020204030204" pitchFamily="49" charset="0"/>
-              </a:rPr>
-              <a:t>    </a:t>
-            </a:r>
-            <a:r>
-              <a:rPr lang="en-US" dirty="0">
-                <a:solidFill>
-                  <a:schemeClr val="accent3"/>
-                </a:solidFill>
-                <a:latin typeface="Consolas" panose="020B0609020204030204" pitchFamily="49" charset="0"/>
-              </a:rPr>
-              <a:t>% </a:t>
-            </a:r>
-            <a:r>
-              <a:rPr lang="ja-JP" altLang="en-US" dirty="0">
-                <a:solidFill>
-                  <a:schemeClr val="accent3"/>
-                </a:solidFill>
-                <a:latin typeface="Consolas" panose="020B0609020204030204" pitchFamily="49" charset="0"/>
-              </a:rPr>
-              <a:t>元のドキュメントクラス</a:t>
-            </a:r>
-            <a:endParaRPr kumimoji="1" lang="en-US" dirty="0">
-              <a:solidFill>
-                <a:schemeClr val="accent3"/>
-              </a:solidFill>
-              <a:latin typeface="Consolas" panose="020B0609020204030204" pitchFamily="49" charset="0"/>
-            </a:endParaRPr>
-          </a:p>
-          <a:p>
-            <a:r>
-              <a:rPr kumimoji="1" lang="en-US" dirty="0">
-                <a:solidFill>
-                  <a:schemeClr val="tx1">
-                    <a:lumMod val="75000"/>
-                    <a:lumOff val="25000"/>
-                  </a:schemeClr>
-                </a:solidFill>
-                <a:latin typeface="Consolas" panose="020B0609020204030204" pitchFamily="49" charset="0"/>
-              </a:rPr>
-              <a:t>    </a:t>
-            </a:r>
-            <a:r>
-              <a:rPr kumimoji="1" lang="en-US" dirty="0">
-                <a:solidFill>
-                  <a:schemeClr val="accent5"/>
-                </a:solidFill>
-                <a:latin typeface="Consolas" panose="020B0609020204030204" pitchFamily="49" charset="0"/>
-              </a:rPr>
-              <a:t>\</a:t>
-            </a:r>
-            <a:r>
-              <a:rPr kumimoji="1" lang="en-US" dirty="0" err="1">
-                <a:solidFill>
-                  <a:schemeClr val="accent5"/>
-                </a:solidFill>
-                <a:latin typeface="Consolas" panose="020B0609020204030204" pitchFamily="49" charset="0"/>
-              </a:rPr>
-              <a:t>documentclass</a:t>
-            </a:r>
-            <a:r>
-              <a:rPr kumimoji="1" lang="en-US" dirty="0">
-                <a:solidFill>
-                  <a:schemeClr val="tx1">
-                    <a:lumMod val="75000"/>
-                    <a:lumOff val="25000"/>
-                  </a:schemeClr>
-                </a:solidFill>
-                <a:latin typeface="Consolas" panose="020B0609020204030204" pitchFamily="49" charset="0"/>
-              </a:rPr>
-              <a:t>[</a:t>
-            </a:r>
-            <a:r>
-              <a:rPr kumimoji="1" lang="en-US" dirty="0" err="1">
-                <a:solidFill>
-                  <a:schemeClr val="tx1">
-                    <a:lumMod val="75000"/>
-                    <a:lumOff val="25000"/>
-                  </a:schemeClr>
-                </a:solidFill>
-                <a:latin typeface="Consolas" panose="020B0609020204030204" pitchFamily="49" charset="0"/>
-              </a:rPr>
-              <a:t>dvipdfmx,conference</a:t>
-            </a:r>
-            <a:r>
-              <a:rPr kumimoji="1" lang="en-US" dirty="0">
-                <a:solidFill>
-                  <a:schemeClr val="tx1">
-                    <a:lumMod val="75000"/>
-                    <a:lumOff val="25000"/>
-                  </a:schemeClr>
-                </a:solidFill>
-                <a:latin typeface="Consolas" panose="020B0609020204030204" pitchFamily="49" charset="0"/>
-              </a:rPr>
-              <a:t>]{</a:t>
-            </a:r>
-            <a:r>
-              <a:rPr kumimoji="1" lang="en-US" dirty="0" err="1">
-                <a:solidFill>
-                  <a:schemeClr val="tx1">
-                    <a:lumMod val="75000"/>
-                    <a:lumOff val="25000"/>
-                  </a:schemeClr>
-                </a:solidFill>
-                <a:latin typeface="Consolas" panose="020B0609020204030204" pitchFamily="49" charset="0"/>
-              </a:rPr>
-              <a:t>IEEEtran</a:t>
-            </a:r>
-            <a:r>
-              <a:rPr kumimoji="1" lang="en-US" dirty="0">
-                <a:solidFill>
-                  <a:schemeClr val="tx1">
-                    <a:lumMod val="75000"/>
-                    <a:lumOff val="25000"/>
-                  </a:schemeClr>
-                </a:solidFill>
-                <a:latin typeface="Consolas" panose="020B0609020204030204" pitchFamily="49" charset="0"/>
-              </a:rPr>
-              <a:t>}</a:t>
-            </a:r>
-          </a:p>
-          <a:p>
-            <a:r>
-              <a:rPr kumimoji="1" lang="en-US" dirty="0">
-                <a:solidFill>
-                  <a:schemeClr val="accent5"/>
-                </a:solidFill>
-                <a:latin typeface="Consolas" panose="020B0609020204030204" pitchFamily="49" charset="0"/>
-              </a:rPr>
-              <a:t>\fi</a:t>
-            </a:r>
+            <a:pPr lvl="1"/>
+            <a:r>
+              <a:rPr kumimoji="1" lang="ja-JP" altLang="en-US" dirty="0"/>
+              <a:t>固有名詞で正しい場合は全部辞書に登録しておく</a:t>
+            </a:r>
+            <a:endParaRPr kumimoji="1" lang="en-US" altLang="ja-JP" dirty="0"/>
           </a:p>
         </p:txBody>
       </p:sp>
     </p:spTree>
     <p:extLst>
       <p:ext uri="{BB962C8B-B14F-4D97-AF65-F5344CB8AC3E}">
-        <p14:creationId xmlns:p14="http://schemas.microsoft.com/office/powerpoint/2010/main" val="1589097440"/>
+        <p14:creationId xmlns:p14="http://schemas.microsoft.com/office/powerpoint/2010/main" val="627829571"/>
       </p:ext>
     </p:extLst>
   </p:cSld>
@@ -9348,7 +9742,7 @@
             <a:pPr lvl="1"/>
             <a:r>
               <a:rPr kumimoji="1" lang="ja-JP" altLang="en-US" sz="1800" dirty="0"/>
-              <a:t>「良い論文」は日本語でも英語でもほぼ同じ構造を持つ</a:t>
+              <a:t>「良い論文」は日本語でも英語でもほぼ同じ構造になる</a:t>
             </a:r>
             <a:endParaRPr kumimoji="1" lang="en-US" altLang="ja-JP" sz="1800" dirty="0"/>
           </a:p>
@@ -9710,7 +10104,23 @@
             </a:pPr>
             <a:r>
               <a:rPr kumimoji="1" lang="ja-JP" altLang="en-US" sz="1800" dirty="0"/>
-              <a:t>（英文校正に出す）</a:t>
+              <a:t>言語</a:t>
+            </a:r>
+            <a:r>
+              <a:rPr lang="ja-JP" altLang="en-US" sz="1800" dirty="0"/>
+              <a:t>生成 </a:t>
+            </a:r>
+            <a:r>
+              <a:rPr lang="en-US" altLang="ja-JP" sz="1800" dirty="0"/>
+              <a:t>AI</a:t>
+            </a:r>
+            <a:r>
+              <a:rPr kumimoji="1" lang="en-US" altLang="ja-JP" sz="1800" dirty="0"/>
+              <a:t> </a:t>
+            </a:r>
+            <a:r>
+              <a:rPr kumimoji="1" lang="ja-JP" altLang="en-US" sz="1800" dirty="0"/>
+              <a:t>を使って英文を校正する</a:t>
             </a:r>
             <a:endParaRPr kumimoji="1" lang="en-US" altLang="ja-JP" sz="1800" dirty="0"/>
           </a:p>
@@ -9854,7 +10264,7 @@
           <a:p>
             <a:r>
               <a:rPr kumimoji="1" lang="ja-JP" altLang="en-US" dirty="0"/>
-              <a:t>著者の英語の能力を上げる事を目的としていない</a:t>
+              <a:t>著者の英語の能力を上げる事は目的としていない</a:t>
             </a:r>
             <a:endParaRPr kumimoji="1" lang="en-US" altLang="ja-JP" dirty="0"/>
           </a:p>
@@ -9989,10 +10399,34 @@
               <a:buAutoNum type="arabicPeriod"/>
             </a:pPr>
             <a:r>
+              <a:rPr kumimoji="1" lang="ja-JP" altLang="en-US" dirty="0"/>
+              <a:t>言語</a:t>
+            </a:r>
+            <a:r>
               <a:rPr lang="ja-JP" altLang="en-US" dirty="0"/>
-              <a:t>文法チェッカーによる確認</a:t>
-            </a:r>
-            <a:endParaRPr lang="en-US" altLang="ja-JP" dirty="0"/>
+              <a:t>生成 </a:t>
+            </a:r>
+            <a:r>
+              <a:rPr lang="en-US" altLang="ja-JP" dirty="0"/>
+              <a:t>AI</a:t>
+            </a:r>
+            <a:r>
+              <a:rPr kumimoji="1" lang="en-US" altLang="ja-JP" dirty="0"/>
+              <a:t> </a:t>
+            </a:r>
+            <a:r>
+              <a:rPr kumimoji="1" lang="ja-JP" altLang="en-US" dirty="0"/>
+              <a:t>を使っ</a:t>
+            </a:r>
+            <a:r>
+              <a:rPr lang="ja-JP" altLang="en-US" dirty="0"/>
+              <a:t>た</a:t>
+            </a:r>
+            <a:r>
+              <a:rPr kumimoji="1" lang="ja-JP" altLang="en-US" dirty="0"/>
+              <a:t>英文の校正</a:t>
+            </a:r>
+            <a:endParaRPr kumimoji="1" lang="en-US" altLang="ja-JP" dirty="0"/>
           </a:p>
           <a:p>
             <a:pPr marL="457200" indent="-457200">
@@ -10000,9 +10434,15 @@
               <a:buAutoNum type="arabicPeriod"/>
             </a:pPr>
             <a:r>
-              <a:rPr kumimoji="1" lang="ja-JP" altLang="en-US" dirty="0"/>
-              <a:t>英文校正について</a:t>
-            </a:r>
+              <a:rPr lang="ja-JP" altLang="en-US" dirty="0"/>
+              <a:t>文法チェッカーによる確認</a:t>
+            </a:r>
+            <a:endParaRPr lang="en-US" altLang="ja-JP" dirty="0"/>
+          </a:p>
+          <a:p>
+            <a:pPr marL="0" indent="0">
+              <a:buNone/>
+            </a:pPr>
             <a:endParaRPr kumimoji="1" lang="en-US" dirty="0"/>
           </a:p>
         </p:txBody>

</xml_diff>